<commit_message>
Cambios a la presentacion y agrega los comandos por medio de curl
</commit_message>
<xml_diff>
--- a/Git.pptx
+++ b/Git.pptx
@@ -5,7 +5,7 @@
     <p:sldMasterId id="2147483660" r:id="rId1"/>
   </p:sldMasterIdLst>
   <p:handoutMasterIdLst>
-    <p:handoutMasterId r:id="rId22"/>
+    <p:handoutMasterId r:id="rId23"/>
   </p:handoutMasterIdLst>
   <p:sldIdLst>
     <p:sldId id="256" r:id="rId2"/>
@@ -20,14 +20,15 @@
     <p:sldId id="266" r:id="rId11"/>
     <p:sldId id="270" r:id="rId12"/>
     <p:sldId id="279" r:id="rId13"/>
-    <p:sldId id="269" r:id="rId14"/>
-    <p:sldId id="271" r:id="rId15"/>
-    <p:sldId id="268" r:id="rId16"/>
-    <p:sldId id="261" r:id="rId17"/>
-    <p:sldId id="260" r:id="rId18"/>
-    <p:sldId id="259" r:id="rId19"/>
-    <p:sldId id="280" r:id="rId20"/>
-    <p:sldId id="262" r:id="rId21"/>
+    <p:sldId id="268" r:id="rId14"/>
+    <p:sldId id="281" r:id="rId15"/>
+    <p:sldId id="282" r:id="rId16"/>
+    <p:sldId id="283" r:id="rId17"/>
+    <p:sldId id="284" r:id="rId18"/>
+    <p:sldId id="285" r:id="rId19"/>
+    <p:sldId id="286" r:id="rId20"/>
+    <p:sldId id="287" r:id="rId21"/>
+    <p:sldId id="262" r:id="rId22"/>
   </p:sldIdLst>
   <p:sldSz cx="12192000" cy="6858000"/>
   <p:notesSz cx="6858000" cy="9144000"/>
@@ -2076,12 +2077,8 @@
         <a:lstStyle/>
         <a:p>
           <a:r>
-            <a:rPr lang="es-MX" dirty="0" err="1"/>
-            <a:t>Repository</a:t>
-          </a:r>
-          <a:r>
             <a:rPr lang="es-MX" dirty="0"/>
-            <a:t> (Repositorio)</a:t>
+            <a:t>Repository (Repositorio)</a:t>
           </a:r>
         </a:p>
       </dgm:t>
@@ -2152,12 +2149,8 @@
         <a:lstStyle/>
         <a:p>
           <a:r>
-            <a:rPr lang="es-MX" dirty="0" err="1"/>
-            <a:t>Fetch</a:t>
-          </a:r>
-          <a:r>
             <a:rPr lang="es-MX" dirty="0"/>
-            <a:t> (Revisar)</a:t>
+            <a:t>Fetch (Revisar)</a:t>
           </a:r>
         </a:p>
       </dgm:t>
@@ -2192,12 +2185,8 @@
         <a:lstStyle/>
         <a:p>
           <a:r>
-            <a:rPr lang="es-MX" dirty="0" err="1"/>
-            <a:t>Pull</a:t>
-          </a:r>
-          <a:r>
             <a:rPr lang="es-MX" dirty="0"/>
-            <a:t>(Incorporar)</a:t>
+            <a:t>Pull(Incorporar)</a:t>
           </a:r>
         </a:p>
       </dgm:t>
@@ -2232,12 +2221,8 @@
         <a:lstStyle/>
         <a:p>
           <a:r>
-            <a:rPr lang="es-MX" dirty="0" err="1"/>
-            <a:t>Push</a:t>
-          </a:r>
-          <a:r>
             <a:rPr lang="es-MX" dirty="0"/>
-            <a:t> (Descargar)</a:t>
+            <a:t>Push (Descargar)</a:t>
           </a:r>
         </a:p>
       </dgm:t>
@@ -2272,12 +2257,8 @@
         <a:lstStyle/>
         <a:p>
           <a:r>
-            <a:rPr lang="es-MX" dirty="0" err="1"/>
-            <a:t>Reset</a:t>
-          </a:r>
-          <a:r>
             <a:rPr lang="es-MX" dirty="0"/>
-            <a:t> (Reiniciar)</a:t>
+            <a:t>Reset (Reiniciar)</a:t>
           </a:r>
         </a:p>
       </dgm:t>
@@ -3584,12 +3565,8 @@
             <a:buNone/>
           </a:pPr>
           <a:r>
-            <a:rPr lang="es-MX" sz="2600" kern="1200" dirty="0" err="1"/>
-            <a:t>Repository</a:t>
-          </a:r>
-          <a:r>
             <a:rPr lang="es-MX" sz="2600" kern="1200" dirty="0"/>
-            <a:t> (Repositorio)</a:t>
+            <a:t>Repository (Repositorio)</a:t>
           </a:r>
         </a:p>
       </dsp:txBody>
@@ -3806,12 +3783,8 @@
             <a:buNone/>
           </a:pPr>
           <a:r>
-            <a:rPr lang="es-MX" sz="2600" kern="1200" dirty="0" err="1"/>
-            <a:t>Fetch</a:t>
-          </a:r>
-          <a:r>
             <a:rPr lang="es-MX" sz="2600" kern="1200" dirty="0"/>
-            <a:t> (Revisar)</a:t>
+            <a:t>Fetch (Revisar)</a:t>
           </a:r>
         </a:p>
       </dsp:txBody>
@@ -3919,12 +3892,8 @@
             <a:buNone/>
           </a:pPr>
           <a:r>
-            <a:rPr lang="es-MX" sz="2600" kern="1200" dirty="0" err="1"/>
-            <a:t>Pull</a:t>
-          </a:r>
-          <a:r>
             <a:rPr lang="es-MX" sz="2600" kern="1200" dirty="0"/>
-            <a:t>(Incorporar)</a:t>
+            <a:t>Pull(Incorporar)</a:t>
           </a:r>
         </a:p>
       </dsp:txBody>
@@ -4032,12 +4001,8 @@
             <a:buNone/>
           </a:pPr>
           <a:r>
-            <a:rPr lang="es-MX" sz="2600" kern="1200" dirty="0" err="1"/>
-            <a:t>Push</a:t>
-          </a:r>
-          <a:r>
             <a:rPr lang="es-MX" sz="2600" kern="1200" dirty="0"/>
-            <a:t> (Descargar)</a:t>
+            <a:t>Push (Descargar)</a:t>
           </a:r>
         </a:p>
       </dsp:txBody>
@@ -4145,12 +4110,8 @@
             <a:buNone/>
           </a:pPr>
           <a:r>
-            <a:rPr lang="es-MX" sz="2600" kern="1200" dirty="0" err="1"/>
-            <a:t>Reset</a:t>
-          </a:r>
-          <a:r>
             <a:rPr lang="es-MX" sz="2600" kern="1200" dirty="0"/>
-            <a:t> (Reiniciar)</a:t>
+            <a:t>Reset (Reiniciar)</a:t>
           </a:r>
         </a:p>
       </dsp:txBody>
@@ -6989,7 +6950,7 @@
           <a:p>
             <a:fld id="{8291C6A9-4179-4CB7-8393-8AE8219F3168}" type="datetimeFigureOut">
               <a:rPr lang="es-MX" smtClean="0"/>
-              <a:t>26/03/2018</a:t>
+              <a:t>24/04/2018</a:t>
             </a:fld>
             <a:endParaRPr lang="es-MX"/>
           </a:p>
@@ -7310,7 +7271,7 @@
           <a:p>
             <a:fld id="{688B3D32-BF94-4C94-B4A6-783CF8FA0F83}" type="datetimeFigureOut">
               <a:rPr lang="es-MX" smtClean="0"/>
-              <a:t>26/03/2018</a:t>
+              <a:t>24/04/2018</a:t>
             </a:fld>
             <a:endParaRPr lang="es-MX"/>
           </a:p>
@@ -7745,7 +7706,7 @@
           <a:p>
             <a:fld id="{688B3D32-BF94-4C94-B4A6-783CF8FA0F83}" type="datetimeFigureOut">
               <a:rPr lang="es-MX" smtClean="0"/>
-              <a:t>26/03/2018</a:t>
+              <a:t>24/04/2018</a:t>
             </a:fld>
             <a:endParaRPr lang="es-MX"/>
           </a:p>
@@ -7915,7 +7876,7 @@
           <a:p>
             <a:fld id="{688B3D32-BF94-4C94-B4A6-783CF8FA0F83}" type="datetimeFigureOut">
               <a:rPr lang="es-MX" smtClean="0"/>
-              <a:t>26/03/2018</a:t>
+              <a:t>24/04/2018</a:t>
             </a:fld>
             <a:endParaRPr lang="es-MX"/>
           </a:p>
@@ -8171,7 +8132,7 @@
           <a:p>
             <a:fld id="{688B3D32-BF94-4C94-B4A6-783CF8FA0F83}" type="datetimeFigureOut">
               <a:rPr lang="es-MX" smtClean="0"/>
-              <a:t>26/03/2018</a:t>
+              <a:t>24/04/2018</a:t>
             </a:fld>
             <a:endParaRPr lang="es-MX"/>
           </a:p>
@@ -8345,7 +8306,7 @@
           <a:p>
             <a:fld id="{688B3D32-BF94-4C94-B4A6-783CF8FA0F83}" type="datetimeFigureOut">
               <a:rPr lang="es-MX" smtClean="0"/>
-              <a:t>26/03/2018</a:t>
+              <a:t>24/04/2018</a:t>
             </a:fld>
             <a:endParaRPr lang="es-MX"/>
           </a:p>
@@ -8688,7 +8649,7 @@
           <a:p>
             <a:fld id="{688B3D32-BF94-4C94-B4A6-783CF8FA0F83}" type="datetimeFigureOut">
               <a:rPr lang="es-MX" smtClean="0"/>
-              <a:t>26/03/2018</a:t>
+              <a:t>24/04/2018</a:t>
             </a:fld>
             <a:endParaRPr lang="es-MX"/>
           </a:p>
@@ -8999,7 +8960,7 @@
           <a:p>
             <a:fld id="{688B3D32-BF94-4C94-B4A6-783CF8FA0F83}" type="datetimeFigureOut">
               <a:rPr lang="es-MX" smtClean="0"/>
-              <a:t>26/03/2018</a:t>
+              <a:t>24/04/2018</a:t>
             </a:fld>
             <a:endParaRPr lang="es-MX"/>
           </a:p>
@@ -9378,7 +9339,7 @@
           <a:p>
             <a:fld id="{688B3D32-BF94-4C94-B4A6-783CF8FA0F83}" type="datetimeFigureOut">
               <a:rPr lang="es-MX" smtClean="0"/>
-              <a:t>26/03/2018</a:t>
+              <a:t>24/04/2018</a:t>
             </a:fld>
             <a:endParaRPr lang="es-MX"/>
           </a:p>
@@ -9496,7 +9457,7 @@
           <a:p>
             <a:fld id="{688B3D32-BF94-4C94-B4A6-783CF8FA0F83}" type="datetimeFigureOut">
               <a:rPr lang="es-MX" smtClean="0"/>
-              <a:t>26/03/2018</a:t>
+              <a:t>24/04/2018</a:t>
             </a:fld>
             <a:endParaRPr lang="es-MX"/>
           </a:p>
@@ -9667,7 +9628,7 @@
           <a:p>
             <a:fld id="{688B3D32-BF94-4C94-B4A6-783CF8FA0F83}" type="datetimeFigureOut">
               <a:rPr lang="es-MX" smtClean="0"/>
-              <a:t>26/03/2018</a:t>
+              <a:t>24/04/2018</a:t>
             </a:fld>
             <a:endParaRPr lang="es-MX"/>
           </a:p>
@@ -9846,7 +9807,7 @@
           <a:p>
             <a:fld id="{688B3D32-BF94-4C94-B4A6-783CF8FA0F83}" type="datetimeFigureOut">
               <a:rPr lang="es-MX" smtClean="0"/>
-              <a:t>26/03/2018</a:t>
+              <a:t>24/04/2018</a:t>
             </a:fld>
             <a:endParaRPr lang="es-MX"/>
           </a:p>
@@ -10230,7 +10191,7 @@
           <a:p>
             <a:fld id="{688B3D32-BF94-4C94-B4A6-783CF8FA0F83}" type="datetimeFigureOut">
               <a:rPr lang="es-MX" smtClean="0"/>
-              <a:t>26/03/2018</a:t>
+              <a:t>24/04/2018</a:t>
             </a:fld>
             <a:endParaRPr lang="es-MX"/>
           </a:p>
@@ -10538,7 +10499,7 @@
           <a:p>
             <a:fld id="{688B3D32-BF94-4C94-B4A6-783CF8FA0F83}" type="datetimeFigureOut">
               <a:rPr lang="es-MX" smtClean="0"/>
-              <a:t>26/03/2018</a:t>
+              <a:t>24/04/2018</a:t>
             </a:fld>
             <a:endParaRPr lang="es-MX"/>
           </a:p>
@@ -11771,18 +11732,13 @@
           <a:p>
             <a:pPr algn="ctr"/>
             <a:r>
-              <a:rPr lang="es-MX" dirty="0" err="1">
+              <a:rPr lang="es-MX" dirty="0">
                 <a:solidFill>
                   <a:schemeClr val="tx1"/>
                 </a:solidFill>
               </a:rPr>
               <a:t>Push</a:t>
             </a:r>
-            <a:endParaRPr lang="es-MX" dirty="0">
-              <a:solidFill>
-                <a:schemeClr val="tx1"/>
-              </a:solidFill>
-            </a:endParaRPr>
           </a:p>
         </p:txBody>
       </p:sp>
@@ -11835,34 +11791,13 @@
           <a:p>
             <a:pPr algn="ctr"/>
             <a:r>
-              <a:rPr lang="es-MX" dirty="0" err="1">
-                <a:solidFill>
-                  <a:schemeClr val="tx1"/>
-                </a:solidFill>
-              </a:rPr>
-              <a:t>Fetch</a:t>
-            </a:r>
-            <a:r>
               <a:rPr lang="es-MX" dirty="0">
                 <a:solidFill>
                   <a:schemeClr val="tx1"/>
                 </a:solidFill>
               </a:rPr>
-              <a:t> -&gt; </a:t>
-            </a:r>
-            <a:r>
-              <a:rPr lang="es-MX" dirty="0" err="1">
-                <a:solidFill>
-                  <a:schemeClr val="tx1"/>
-                </a:solidFill>
-              </a:rPr>
-              <a:t>Pull</a:t>
-            </a:r>
-            <a:endParaRPr lang="es-MX" dirty="0">
-              <a:solidFill>
-                <a:schemeClr val="tx1"/>
-              </a:solidFill>
-            </a:endParaRPr>
+              <a:t>Fetch -&gt; Pull</a:t>
+            </a:r>
           </a:p>
         </p:txBody>
       </p:sp>
@@ -11915,18 +11850,13 @@
           <a:p>
             <a:pPr algn="ctr"/>
             <a:r>
-              <a:rPr lang="es-MX" dirty="0" err="1">
+              <a:rPr lang="es-MX" dirty="0">
                 <a:solidFill>
                   <a:schemeClr val="tx1"/>
                 </a:solidFill>
               </a:rPr>
               <a:t>Add</a:t>
             </a:r>
-            <a:endParaRPr lang="es-MX" dirty="0">
-              <a:solidFill>
-                <a:schemeClr val="tx1"/>
-              </a:solidFill>
-            </a:endParaRPr>
           </a:p>
         </p:txBody>
       </p:sp>
@@ -12018,10 +11948,10 @@
       </p:grpSpPr>
       <p:sp>
         <p:nvSpPr>
-          <p:cNvPr id="2" name="Título 1">
+          <p:cNvPr id="4" name="Título 3">
             <a:extLst>
               <a:ext uri="{FF2B5EF4-FFF2-40B4-BE49-F238E27FC236}">
-                <a16:creationId xmlns:a16="http://schemas.microsoft.com/office/drawing/2014/main" id="{35B52338-AC77-4050-9744-76116798B81C}"/>
+                <a16:creationId xmlns:a16="http://schemas.microsoft.com/office/drawing/2014/main" id="{CDD20BE9-247E-4DC1-8AA5-624B2D32BA1E}"/>
               </a:ext>
             </a:extLst>
           </p:cNvPr>
@@ -12029,7 +11959,7 @@
             <a:spLocks noGrp="1"/>
           </p:cNvSpPr>
           <p:nvPr>
-            <p:ph type="title"/>
+            <p:ph type="ctrTitle"/>
           </p:nvPr>
         </p:nvSpPr>
         <p:spPr/>
@@ -12039,24 +11969,17 @@
           <a:p>
             <a:r>
               <a:rPr lang="es-MX" dirty="0"/>
-              <a:t>Consola de comandos </a:t>
-            </a:r>
-            <a:r>
-              <a:rPr lang="es-MX" dirty="0">
-                <a:sym typeface="Wingdings" panose="05000000000000000000" pitchFamily="2" charset="2"/>
-              </a:rPr>
-              <a:t></a:t>
-            </a:r>
-            <a:endParaRPr lang="es-MX" dirty="0"/>
+              <a:t>Creando un repositorio</a:t>
+            </a:r>
           </a:p>
         </p:txBody>
       </p:sp>
       <p:sp>
         <p:nvSpPr>
-          <p:cNvPr id="3" name="Marcador de contenido 2">
+          <p:cNvPr id="5" name="Subtítulo 4">
             <a:extLst>
               <a:ext uri="{FF2B5EF4-FFF2-40B4-BE49-F238E27FC236}">
-                <a16:creationId xmlns:a16="http://schemas.microsoft.com/office/drawing/2014/main" id="{D1C6CB77-4083-40AD-958D-F36B84E8BCE8}"/>
+                <a16:creationId xmlns:a16="http://schemas.microsoft.com/office/drawing/2014/main" id="{719F1DF2-D97D-4AC4-B181-09A54F684622}"/>
               </a:ext>
             </a:extLst>
           </p:cNvPr>
@@ -12064,7 +11987,7 @@
             <a:spLocks noGrp="1"/>
           </p:cNvSpPr>
           <p:nvPr>
-            <p:ph idx="1"/>
+            <p:ph type="subTitle" idx="1"/>
           </p:nvPr>
         </p:nvSpPr>
         <p:spPr/>
@@ -12072,14 +11995,14 @@
           <a:bodyPr/>
           <a:lstStyle/>
           <a:p>
-            <a:endParaRPr lang="es-MX" dirty="0"/>
+            <a:endParaRPr lang="es-MX"/>
           </a:p>
         </p:txBody>
       </p:sp>
     </p:spTree>
     <p:extLst>
       <p:ext uri="{BB962C8B-B14F-4D97-AF65-F5344CB8AC3E}">
-        <p14:creationId xmlns:p14="http://schemas.microsoft.com/office/powerpoint/2010/main" val="562606424"/>
+        <p14:creationId xmlns:p14="http://schemas.microsoft.com/office/powerpoint/2010/main" val="49385739"/>
       </p:ext>
     </p:extLst>
   </p:cSld>
@@ -12111,7 +12034,7 @@
           <p:cNvPr id="2" name="Título 1">
             <a:extLst>
               <a:ext uri="{FF2B5EF4-FFF2-40B4-BE49-F238E27FC236}">
-                <a16:creationId xmlns:a16="http://schemas.microsoft.com/office/drawing/2014/main" id="{86DCD3C7-DA8C-4413-A021-13BECC2198C2}"/>
+                <a16:creationId xmlns:a16="http://schemas.microsoft.com/office/drawing/2014/main" id="{251E514D-9469-4ED8-9826-7A32DBF26DF1}"/>
               </a:ext>
             </a:extLst>
           </p:cNvPr>
@@ -12129,8 +12052,23 @@
           <a:p>
             <a:r>
               <a:rPr lang="es-MX" dirty="0"/>
-              <a:t>Problemas Ultra Comunes…</a:t>
-            </a:r>
+              <a:t>Comandos for 1</a:t>
+            </a:r>
+            <a:r>
+              <a:rPr lang="es-MX" baseline="30000" dirty="0"/>
+              <a:t>st</a:t>
+            </a:r>
+            <a:r>
+              <a:rPr lang="es-MX" dirty="0"/>
+              <a:t> Repo </a:t>
+            </a:r>
+            <a:r>
+              <a:rPr lang="es-MX" dirty="0">
+                <a:sym typeface="Wingdings" panose="05000000000000000000" pitchFamily="2" charset="2"/>
+              </a:rPr>
+              <a:t></a:t>
+            </a:r>
+            <a:endParaRPr lang="es-MX" dirty="0"/>
           </a:p>
         </p:txBody>
       </p:sp>
@@ -12139,7 +12077,7 @@
           <p:cNvPr id="3" name="Marcador de contenido 2">
             <a:extLst>
               <a:ext uri="{FF2B5EF4-FFF2-40B4-BE49-F238E27FC236}">
-                <a16:creationId xmlns:a16="http://schemas.microsoft.com/office/drawing/2014/main" id="{79F68312-12A4-4EAE-8A64-CF51DE58508E}"/>
+                <a16:creationId xmlns:a16="http://schemas.microsoft.com/office/drawing/2014/main" id="{D7829B4D-455A-4350-A12F-0447ECD0BFFF}"/>
               </a:ext>
             </a:extLst>
           </p:cNvPr>
@@ -12152,29 +12090,210 @@
         </p:nvSpPr>
         <p:spPr/>
         <p:txBody>
-          <a:bodyPr/>
+          <a:bodyPr>
+            <a:normAutofit/>
+          </a:bodyPr>
           <a:lstStyle/>
           <a:p>
+            <a:pPr marL="457200" indent="-457200">
+              <a:buFont typeface="+mj-lt"/>
+              <a:buAutoNum type="arabicPeriod"/>
+            </a:pPr>
+            <a:r>
+              <a:rPr lang="es-MX" dirty="0"/>
+              <a:t>curl -u </a:t>
+            </a:r>
+            <a:r>
+              <a:rPr lang="es-MX" b="1" dirty="0">
+                <a:solidFill>
+                  <a:srgbClr val="404040"/>
+                </a:solidFill>
+              </a:rPr>
+              <a:t>“</a:t>
+            </a:r>
+            <a:r>
+              <a:rPr lang="es-MX" b="1" dirty="0">
+                <a:solidFill>
+                  <a:srgbClr val="FF0000"/>
+                </a:solidFill>
+              </a:rPr>
+              <a:t>user:password</a:t>
+            </a:r>
+            <a:r>
+              <a:rPr lang="es-MX" b="1" dirty="0">
+                <a:solidFill>
+                  <a:srgbClr val="404040"/>
+                </a:solidFill>
+              </a:rPr>
+              <a:t>"</a:t>
+            </a:r>
+            <a:r>
+              <a:rPr lang="es-MX" b="1" dirty="0">
+                <a:solidFill>
+                  <a:srgbClr val="FF0000"/>
+                </a:solidFill>
+              </a:rPr>
+              <a:t> </a:t>
+            </a:r>
+            <a:r>
+              <a:rPr lang="es-MX" dirty="0"/>
+              <a:t>https://api.github.com/user/repos -d "{\"name\":\</a:t>
+            </a:r>
+            <a:r>
+              <a:rPr lang="es-MX" b="1" dirty="0">
+                <a:solidFill>
+                  <a:srgbClr val="FF0000"/>
+                </a:solidFill>
+              </a:rPr>
+              <a:t>:</a:t>
+            </a:r>
+            <a:r>
+              <a:rPr lang="es-MX" b="1" dirty="0" err="1">
+                <a:solidFill>
+                  <a:srgbClr val="FF0000"/>
+                </a:solidFill>
+              </a:rPr>
+              <a:t>repoName</a:t>
+            </a:r>
+            <a:r>
+              <a:rPr lang="es-MX" dirty="0"/>
+              <a:t>\"}“</a:t>
+            </a:r>
+          </a:p>
+          <a:p>
+            <a:pPr marL="457200" indent="-457200">
+              <a:buFont typeface="+mj-lt"/>
+              <a:buAutoNum type="arabicPeriod"/>
+            </a:pPr>
+            <a:r>
+              <a:rPr lang="es-MX" dirty="0"/>
+              <a:t>echo “Contenido del README" &gt;&gt; README.md</a:t>
+            </a:r>
+          </a:p>
+          <a:p>
+            <a:pPr marL="457200" indent="-457200">
+              <a:buFont typeface="+mj-lt"/>
+              <a:buAutoNum type="arabicPeriod"/>
+            </a:pPr>
+            <a:r>
+              <a:rPr lang="es-MX" dirty="0"/>
+              <a:t>git init</a:t>
+            </a:r>
+          </a:p>
+          <a:p>
+            <a:pPr marL="457200" indent="-457200">
+              <a:buFont typeface="+mj-lt"/>
+              <a:buAutoNum type="arabicPeriod"/>
+            </a:pPr>
+            <a:r>
+              <a:rPr lang="es-MX" dirty="0"/>
+              <a:t>git add README.md</a:t>
+            </a:r>
+          </a:p>
+          <a:p>
+            <a:pPr marL="457200" indent="-457200">
+              <a:buFont typeface="+mj-lt"/>
+              <a:buAutoNum type="arabicPeriod"/>
+            </a:pPr>
+            <a:r>
+              <a:rPr lang="es-MX" dirty="0"/>
+              <a:t>git commit -m </a:t>
+            </a:r>
+            <a:r>
+              <a:rPr lang="es-MX" b="1" dirty="0">
+                <a:solidFill>
+                  <a:srgbClr val="404040"/>
+                </a:solidFill>
+              </a:rPr>
+              <a:t>“</a:t>
+            </a:r>
+            <a:r>
+              <a:rPr lang="es-MX" b="1" dirty="0">
+                <a:solidFill>
+                  <a:srgbClr val="FF0000"/>
+                </a:solidFill>
+              </a:rPr>
+              <a:t>Comentario del primer commit</a:t>
+            </a:r>
+            <a:r>
+              <a:rPr lang="es-MX" b="1" dirty="0">
+                <a:solidFill>
+                  <a:srgbClr val="404040"/>
+                </a:solidFill>
+              </a:rPr>
+              <a:t>”</a:t>
+            </a:r>
+          </a:p>
+          <a:p>
+            <a:pPr marL="457200" indent="-457200">
+              <a:buFont typeface="+mj-lt"/>
+              <a:buAutoNum type="arabicPeriod"/>
+            </a:pPr>
+            <a:r>
+              <a:rPr lang="es-MX" dirty="0"/>
+              <a:t>git remote add origin https://github.com/</a:t>
+            </a:r>
+            <a:r>
+              <a:rPr lang="es-MX" b="1" dirty="0">
+                <a:solidFill>
+                  <a:srgbClr val="FF0000"/>
+                </a:solidFill>
+              </a:rPr>
+              <a:t>user</a:t>
+            </a:r>
+            <a:r>
+              <a:rPr lang="es-MX" dirty="0"/>
+              <a:t>/</a:t>
+            </a:r>
+            <a:r>
+              <a:rPr lang="es-MX" b="1" dirty="0">
+                <a:solidFill>
+                  <a:srgbClr val="FF0000"/>
+                </a:solidFill>
+              </a:rPr>
+              <a:t>:repoName</a:t>
+            </a:r>
+            <a:r>
+              <a:rPr lang="es-MX" dirty="0"/>
+              <a:t>.git</a:t>
+            </a:r>
+          </a:p>
+          <a:p>
+            <a:pPr marL="457200" indent="-457200">
+              <a:buFont typeface="+mj-lt"/>
+              <a:buAutoNum type="arabicPeriod"/>
+            </a:pPr>
+            <a:r>
+              <a:rPr lang="es-MX" dirty="0"/>
+              <a:t>git push -u origin master</a:t>
+            </a:r>
+          </a:p>
+          <a:p>
+            <a:pPr marL="0" indent="0">
+              <a:buNone/>
+            </a:pPr>
+            <a:endParaRPr lang="es-MX" dirty="0"/>
+          </a:p>
+          <a:p>
+            <a:r>
+              <a:rPr lang="es-MX" dirty="0"/>
+              <a:t>:</a:t>
+            </a:r>
             <a:r>
               <a:rPr lang="es-MX" dirty="0" err="1"/>
-              <a:t>Merge</a:t>
+              <a:t>repoName</a:t>
             </a:r>
             <a:r>
               <a:rPr lang="es-MX" dirty="0"/>
-              <a:t> </a:t>
-            </a:r>
-            <a:r>
-              <a:rPr lang="es-MX" dirty="0" err="1"/>
-              <a:t>Failed</a:t>
-            </a:r>
-            <a:endParaRPr lang="es-MX" dirty="0"/>
+              <a:t>	Nombre del repositorio donde se va a guardar</a:t>
+            </a:r>
           </a:p>
         </p:txBody>
       </p:sp>
     </p:spTree>
     <p:extLst>
       <p:ext uri="{BB962C8B-B14F-4D97-AF65-F5344CB8AC3E}">
-        <p14:creationId xmlns:p14="http://schemas.microsoft.com/office/powerpoint/2010/main" val="272385480"/>
+        <p14:creationId xmlns:p14="http://schemas.microsoft.com/office/powerpoint/2010/main" val="2731672683"/>
       </p:ext>
     </p:extLst>
   </p:cSld>
@@ -12203,10 +12322,10 @@
       </p:grpSpPr>
       <p:sp>
         <p:nvSpPr>
-          <p:cNvPr id="4" name="Título 3">
+          <p:cNvPr id="2" name="Título 1">
             <a:extLst>
               <a:ext uri="{FF2B5EF4-FFF2-40B4-BE49-F238E27FC236}">
-                <a16:creationId xmlns:a16="http://schemas.microsoft.com/office/drawing/2014/main" id="{CDD20BE9-247E-4DC1-8AA5-624B2D32BA1E}"/>
+                <a16:creationId xmlns:a16="http://schemas.microsoft.com/office/drawing/2014/main" id="{243FC0D6-1EA9-477D-99D4-9C7C79B546E6}"/>
               </a:ext>
             </a:extLst>
           </p:cNvPr>
@@ -12214,7 +12333,7 @@
             <a:spLocks noGrp="1"/>
           </p:cNvSpPr>
           <p:nvPr>
-            <p:ph type="ctrTitle"/>
+            <p:ph type="title"/>
           </p:nvPr>
         </p:nvSpPr>
         <p:spPr/>
@@ -12224,17 +12343,17 @@
           <a:p>
             <a:r>
               <a:rPr lang="es-MX" dirty="0"/>
-              <a:t>Creando un repositorio</a:t>
+              <a:t>Mandar Invitación</a:t>
             </a:r>
           </a:p>
         </p:txBody>
       </p:sp>
       <p:sp>
         <p:nvSpPr>
-          <p:cNvPr id="5" name="Subtítulo 4">
+          <p:cNvPr id="3" name="Marcador de contenido 2">
             <a:extLst>
               <a:ext uri="{FF2B5EF4-FFF2-40B4-BE49-F238E27FC236}">
-                <a16:creationId xmlns:a16="http://schemas.microsoft.com/office/drawing/2014/main" id="{719F1DF2-D97D-4AC4-B181-09A54F684622}"/>
+                <a16:creationId xmlns:a16="http://schemas.microsoft.com/office/drawing/2014/main" id="{1BBADBA3-EF40-4872-9C25-AC03F9475DF1}"/>
               </a:ext>
             </a:extLst>
           </p:cNvPr>
@@ -12242,7 +12361,7 @@
             <a:spLocks noGrp="1"/>
           </p:cNvSpPr>
           <p:nvPr>
-            <p:ph type="subTitle" idx="1"/>
+            <p:ph idx="1"/>
           </p:nvPr>
         </p:nvSpPr>
         <p:spPr/>
@@ -12250,14 +12369,123 @@
           <a:bodyPr/>
           <a:lstStyle/>
           <a:p>
-            <a:endParaRPr lang="es-MX"/>
+            <a:r>
+              <a:rPr lang="nl-NL" dirty="0"/>
+              <a:t>curl -i -u “</a:t>
+            </a:r>
+            <a:r>
+              <a:rPr lang="nl-NL" b="1" dirty="0">
+                <a:solidFill>
+                  <a:srgbClr val="FF0000"/>
+                </a:solidFill>
+              </a:rPr>
+              <a:t>user:password</a:t>
+            </a:r>
+            <a:r>
+              <a:rPr lang="nl-NL" dirty="0"/>
+              <a:t>" -X PUT -d '' "https://api.github.com/repos/</a:t>
+            </a:r>
+            <a:r>
+              <a:rPr lang="nl-NL" b="1" dirty="0">
+                <a:solidFill>
+                  <a:srgbClr val="FF0000"/>
+                </a:solidFill>
+              </a:rPr>
+              <a:t>:owner</a:t>
+            </a:r>
+            <a:r>
+              <a:rPr lang="nl-NL" dirty="0"/>
+              <a:t>/</a:t>
+            </a:r>
+            <a:r>
+              <a:rPr lang="nl-NL" b="1" dirty="0">
+                <a:solidFill>
+                  <a:srgbClr val="FF0000"/>
+                </a:solidFill>
+              </a:rPr>
+              <a:t>:repoName</a:t>
+            </a:r>
+            <a:r>
+              <a:rPr lang="nl-NL" dirty="0"/>
+              <a:t>/collaborators/</a:t>
+            </a:r>
+            <a:r>
+              <a:rPr lang="nl-NL" b="1" dirty="0">
+                <a:solidFill>
+                  <a:srgbClr val="FF0000"/>
+                </a:solidFill>
+              </a:rPr>
+              <a:t>:profileToInvite</a:t>
+            </a:r>
+            <a:r>
+              <a:rPr lang="nl-NL" dirty="0"/>
+              <a:t>"</a:t>
+            </a:r>
+          </a:p>
+          <a:p>
+            <a:endParaRPr lang="es-MX" dirty="0"/>
+          </a:p>
+          <a:p>
+            <a:r>
+              <a:rPr lang="es-MX" dirty="0"/>
+              <a:t>:</a:t>
+            </a:r>
+            <a:r>
+              <a:rPr lang="es-MX" dirty="0" err="1"/>
+              <a:t>owner</a:t>
+            </a:r>
+            <a:r>
+              <a:rPr lang="es-MX" dirty="0"/>
+              <a:t>		Propietario del repositorio a invitar</a:t>
+            </a:r>
+          </a:p>
+          <a:p>
+            <a:r>
+              <a:rPr lang="es-MX" dirty="0"/>
+              <a:t>:</a:t>
+            </a:r>
+            <a:r>
+              <a:rPr lang="es-MX" dirty="0" err="1"/>
+              <a:t>repoName</a:t>
+            </a:r>
+            <a:r>
+              <a:rPr lang="es-MX" dirty="0"/>
+              <a:t>	Nombre del repositorio al que se va a agregar</a:t>
+            </a:r>
+          </a:p>
+          <a:p>
+            <a:r>
+              <a:rPr lang="es-MX" dirty="0"/>
+              <a:t>:</a:t>
+            </a:r>
+            <a:r>
+              <a:rPr lang="es-MX" dirty="0" err="1"/>
+              <a:t>profileToInvite</a:t>
+            </a:r>
+            <a:r>
+              <a:rPr lang="es-MX" dirty="0"/>
+              <a:t>	Nombre de usuario del colaborador</a:t>
+            </a:r>
+          </a:p>
+          <a:p>
+            <a:endParaRPr lang="es-MX" dirty="0"/>
+          </a:p>
+          <a:p>
+            <a:r>
+              <a:rPr lang="es-MX" dirty="0"/>
+              <a:t>Regresa un ID de invitación…</a:t>
+            </a:r>
+            <a:br>
+              <a:rPr lang="es-MX" dirty="0"/>
+            </a:br>
+            <a:endParaRPr lang="es-MX" dirty="0"/>
           </a:p>
         </p:txBody>
       </p:sp>
     </p:spTree>
     <p:extLst>
       <p:ext uri="{BB962C8B-B14F-4D97-AF65-F5344CB8AC3E}">
-        <p14:creationId xmlns:p14="http://schemas.microsoft.com/office/powerpoint/2010/main" val="49385739"/>
+        <p14:creationId xmlns:p14="http://schemas.microsoft.com/office/powerpoint/2010/main" val="1708602054"/>
       </p:ext>
     </p:extLst>
   </p:cSld>
@@ -12270,6 +12498,14 @@
 <file path=ppt/slides/slide16.xml><?xml version="1.0" encoding="utf-8"?>
 <p:sld xmlns:a="http://schemas.openxmlformats.org/drawingml/2006/main" xmlns:r="http://schemas.openxmlformats.org/officeDocument/2006/relationships" xmlns:p="http://schemas.openxmlformats.org/presentationml/2006/main">
   <p:cSld>
+    <p:bg>
+      <p:bgPr>
+        <a:solidFill>
+          <a:schemeClr val="bg1"/>
+        </a:solidFill>
+        <a:effectLst/>
+      </p:bgPr>
+    </p:bg>
     <p:spTree>
       <p:nvGrpSpPr>
         <p:cNvPr id="1" name=""/>
@@ -12286,156 +12522,321 @@
       </p:grpSpPr>
       <p:sp>
         <p:nvSpPr>
-          <p:cNvPr id="2" name="Título 1">
+          <p:cNvPr id="9" name="Rectangle 8">
             <a:extLst>
               <a:ext uri="{FF2B5EF4-FFF2-40B4-BE49-F238E27FC236}">
-                <a16:creationId xmlns:a16="http://schemas.microsoft.com/office/drawing/2014/main" id="{6456D6DA-0F6B-415C-9E53-3269145E6265}"/>
+                <a16:creationId xmlns:a16="http://schemas.microsoft.com/office/drawing/2014/main" id="{C2579DAE-C141-48DB-810E-C070C300819E}"/>
               </a:ext>
             </a:extLst>
           </p:cNvPr>
           <p:cNvSpPr>
-            <a:spLocks noGrp="1"/>
+            <a:spLocks noGrp="1" noRot="1" noChangeAspect="1" noMove="1" noResize="1" noEditPoints="1" noAdjustHandles="1" noChangeArrowheads="1" noChangeShapeType="1" noTextEdit="1"/>
           </p:cNvSpPr>
           <p:nvPr>
-            <p:ph type="title"/>
+            <p:extLst>
+              <p:ext uri="{386F3935-93C4-4BCD-93E2-E3B085C9AB24}">
+                <p16:designElem xmlns:p16="http://schemas.microsoft.com/office/powerpoint/2015/main" val="1"/>
+              </p:ext>
+            </p:extLst>
           </p:nvPr>
         </p:nvSpPr>
-        <p:spPr/>
+        <p:spPr>
+          <a:xfrm>
+            <a:off x="3175" y="6400800"/>
+            <a:ext cx="12188825" cy="457200"/>
+          </a:xfrm>
+          <a:prstGeom prst="rect">
+            <a:avLst/>
+          </a:prstGeom>
+          <a:solidFill>
+            <a:schemeClr val="accent2"/>
+          </a:solidFill>
+          <a:ln>
+            <a:noFill/>
+          </a:ln>
+        </p:spPr>
+        <p:style>
+          <a:lnRef idx="2">
+            <a:schemeClr val="accent1">
+              <a:shade val="50000"/>
+            </a:schemeClr>
+          </a:lnRef>
+          <a:fillRef idx="1">
+            <a:schemeClr val="accent1"/>
+          </a:fillRef>
+          <a:effectRef idx="0">
+            <a:schemeClr val="accent1"/>
+          </a:effectRef>
+          <a:fontRef idx="minor">
+            <a:schemeClr val="lt1"/>
+          </a:fontRef>
+        </p:style>
+      </p:sp>
+      <p:sp>
+        <p:nvSpPr>
+          <p:cNvPr id="11" name="Rectangle 10">
+            <a:extLst>
+              <a:ext uri="{FF2B5EF4-FFF2-40B4-BE49-F238E27FC236}">
+                <a16:creationId xmlns:a16="http://schemas.microsoft.com/office/drawing/2014/main" id="{02FD90C3-6350-4D5B-9738-6E94EDF30F74}"/>
+              </a:ext>
+            </a:extLst>
+          </p:cNvPr>
+          <p:cNvSpPr>
+            <a:spLocks noGrp="1" noRot="1" noChangeAspect="1" noMove="1" noResize="1" noEditPoints="1" noAdjustHandles="1" noChangeArrowheads="1" noChangeShapeType="1" noTextEdit="1"/>
+          </p:cNvSpPr>
+          <p:nvPr>
+            <p:extLst>
+              <p:ext uri="{386F3935-93C4-4BCD-93E2-E3B085C9AB24}">
+                <p16:designElem xmlns:p16="http://schemas.microsoft.com/office/powerpoint/2015/main" val="1"/>
+              </p:ext>
+            </p:extLst>
+          </p:nvPr>
+        </p:nvSpPr>
+        <p:spPr>
+          <a:xfrm>
+            <a:off x="15" y="6334316"/>
+            <a:ext cx="12188825" cy="64008"/>
+          </a:xfrm>
+          <a:prstGeom prst="rect">
+            <a:avLst/>
+          </a:prstGeom>
+          <a:solidFill>
+            <a:schemeClr val="accent1"/>
+          </a:solidFill>
+          <a:ln>
+            <a:noFill/>
+          </a:ln>
+        </p:spPr>
+        <p:style>
+          <a:lnRef idx="2">
+            <a:schemeClr val="accent1">
+              <a:shade val="50000"/>
+            </a:schemeClr>
+          </a:lnRef>
+          <a:fillRef idx="1">
+            <a:schemeClr val="accent1"/>
+          </a:fillRef>
+          <a:effectRef idx="0">
+            <a:schemeClr val="accent1"/>
+          </a:effectRef>
+          <a:fontRef idx="minor">
+            <a:schemeClr val="lt1"/>
+          </a:fontRef>
+        </p:style>
+      </p:sp>
+      <p:sp>
+        <p:nvSpPr>
+          <p:cNvPr id="13" name="Rectangle 12">
+            <a:extLst>
+              <a:ext uri="{FF2B5EF4-FFF2-40B4-BE49-F238E27FC236}">
+                <a16:creationId xmlns:a16="http://schemas.microsoft.com/office/drawing/2014/main" id="{41497DE5-0939-4D1D-9350-0C5E1B209C68}"/>
+              </a:ext>
+            </a:extLst>
+          </p:cNvPr>
+          <p:cNvSpPr>
+            <a:spLocks noGrp="1" noRot="1" noChangeAspect="1" noMove="1" noResize="1" noEditPoints="1" noAdjustHandles="1" noChangeArrowheads="1" noChangeShapeType="1" noTextEdit="1"/>
+          </p:cNvSpPr>
+          <p:nvPr>
+            <p:extLst>
+              <p:ext uri="{386F3935-93C4-4BCD-93E2-E3B085C9AB24}">
+                <p16:designElem xmlns:p16="http://schemas.microsoft.com/office/powerpoint/2015/main" val="1"/>
+              </p:ext>
+            </p:extLst>
+          </p:nvPr>
+        </p:nvSpPr>
+        <p:spPr>
+          <a:xfrm>
+            <a:off x="0" y="0"/>
+            <a:ext cx="12192000" cy="6858000"/>
+          </a:xfrm>
+          <a:prstGeom prst="rect">
+            <a:avLst/>
+          </a:prstGeom>
+          <a:solidFill>
+            <a:schemeClr val="accent2"/>
+          </a:solidFill>
+          <a:ln>
+            <a:noFill/>
+          </a:ln>
+        </p:spPr>
+        <p:style>
+          <a:lnRef idx="2">
+            <a:schemeClr val="accent1">
+              <a:shade val="50000"/>
+            </a:schemeClr>
+          </a:lnRef>
+          <a:fillRef idx="1">
+            <a:schemeClr val="accent1"/>
+          </a:fillRef>
+          <a:effectRef idx="0">
+            <a:schemeClr val="accent1"/>
+          </a:effectRef>
+          <a:fontRef idx="minor">
+            <a:schemeClr val="lt1"/>
+          </a:fontRef>
+        </p:style>
         <p:txBody>
-          <a:bodyPr/>
+          <a:bodyPr rtlCol="0" anchor="ctr"/>
           <a:lstStyle/>
           <a:p>
-            <a:r>
-              <a:rPr lang="es-MX" dirty="0"/>
-              <a:t>Uso de Ramas</a:t>
-            </a:r>
+            <a:pPr algn="ctr"/>
+            <a:endParaRPr lang="en-US"/>
           </a:p>
         </p:txBody>
       </p:sp>
       <p:sp>
         <p:nvSpPr>
-          <p:cNvPr id="6" name="Marcador de texto 5">
+          <p:cNvPr id="15" name="Rectangle 14">
             <a:extLst>
               <a:ext uri="{FF2B5EF4-FFF2-40B4-BE49-F238E27FC236}">
-                <a16:creationId xmlns:a16="http://schemas.microsoft.com/office/drawing/2014/main" id="{F0AF5975-DE50-4C1F-B5CD-B1E723E65F84}"/>
+                <a16:creationId xmlns:a16="http://schemas.microsoft.com/office/drawing/2014/main" id="{5CCC70ED-6C63-4537-B7EB-51990D6C0A6F}"/>
               </a:ext>
             </a:extLst>
           </p:cNvPr>
           <p:cNvSpPr>
-            <a:spLocks noGrp="1"/>
+            <a:spLocks noGrp="1" noRot="1" noChangeAspect="1" noMove="1" noResize="1" noEditPoints="1" noAdjustHandles="1" noChangeArrowheads="1" noChangeShapeType="1" noTextEdit="1"/>
           </p:cNvSpPr>
           <p:nvPr>
-            <p:ph type="body" idx="1"/>
+            <p:extLst>
+              <p:ext uri="{386F3935-93C4-4BCD-93E2-E3B085C9AB24}">
+                <p16:designElem xmlns:p16="http://schemas.microsoft.com/office/powerpoint/2015/main" val="1"/>
+              </p:ext>
+            </p:extLst>
           </p:nvPr>
         </p:nvSpPr>
-        <p:spPr/>
+        <p:spPr>
+          <a:xfrm>
+            <a:off x="458724" y="457200"/>
+            <a:ext cx="11274552" cy="5943600"/>
+          </a:xfrm>
+          <a:prstGeom prst="rect">
+            <a:avLst/>
+          </a:prstGeom>
+          <a:ln>
+            <a:noFill/>
+          </a:ln>
+        </p:spPr>
+        <p:style>
+          <a:lnRef idx="2">
+            <a:schemeClr val="accent1">
+              <a:shade val="50000"/>
+            </a:schemeClr>
+          </a:lnRef>
+          <a:fillRef idx="1">
+            <a:schemeClr val="accent1"/>
+          </a:fillRef>
+          <a:effectRef idx="0">
+            <a:schemeClr val="accent1"/>
+          </a:effectRef>
+          <a:fontRef idx="minor">
+            <a:schemeClr val="lt1"/>
+          </a:fontRef>
+        </p:style>
         <p:txBody>
-          <a:bodyPr/>
+          <a:bodyPr rtlCol="0" anchor="ctr"/>
           <a:lstStyle/>
           <a:p>
-            <a:r>
-              <a:rPr lang="es-MX" dirty="0"/>
-              <a:t>Ventajas</a:t>
-            </a:r>
+            <a:pPr algn="ctr"/>
+            <a:endParaRPr lang="en-US"/>
           </a:p>
         </p:txBody>
       </p:sp>
       <p:sp>
         <p:nvSpPr>
-          <p:cNvPr id="7" name="Marcador de contenido 6">
+          <p:cNvPr id="17" name="Rectangle 16">
             <a:extLst>
               <a:ext uri="{FF2B5EF4-FFF2-40B4-BE49-F238E27FC236}">
-                <a16:creationId xmlns:a16="http://schemas.microsoft.com/office/drawing/2014/main" id="{D0C78EE4-8A24-4D56-B1B0-78A2DC59BD65}"/>
+                <a16:creationId xmlns:a16="http://schemas.microsoft.com/office/drawing/2014/main" id="{B76E24C1-2968-40DC-A36E-F6B85F0F0752}"/>
               </a:ext>
             </a:extLst>
           </p:cNvPr>
           <p:cNvSpPr>
-            <a:spLocks noGrp="1"/>
+            <a:spLocks noGrp="1" noRot="1" noChangeAspect="1" noMove="1" noResize="1" noEditPoints="1" noAdjustHandles="1" noChangeArrowheads="1" noChangeShapeType="1" noTextEdit="1"/>
           </p:cNvSpPr>
           <p:nvPr>
-            <p:ph sz="half" idx="2"/>
+            <p:extLst>
+              <p:ext uri="{386F3935-93C4-4BCD-93E2-E3B085C9AB24}">
+                <p16:designElem xmlns:p16="http://schemas.microsoft.com/office/powerpoint/2015/main" val="1"/>
+              </p:ext>
+            </p:extLst>
           </p:nvPr>
         </p:nvSpPr>
-        <p:spPr/>
+        <p:spPr>
+          <a:xfrm>
+            <a:off x="522732" y="521208"/>
+            <a:ext cx="11146536" cy="5815584"/>
+          </a:xfrm>
+          <a:prstGeom prst="rect">
+            <a:avLst/>
+          </a:prstGeom>
+          <a:solidFill>
+            <a:srgbClr val="FFFFFF"/>
+          </a:solidFill>
+          <a:ln>
+            <a:noFill/>
+          </a:ln>
+        </p:spPr>
+        <p:style>
+          <a:lnRef idx="2">
+            <a:schemeClr val="accent1">
+              <a:shade val="50000"/>
+            </a:schemeClr>
+          </a:lnRef>
+          <a:fillRef idx="1">
+            <a:schemeClr val="accent1"/>
+          </a:fillRef>
+          <a:effectRef idx="0">
+            <a:schemeClr val="accent1"/>
+          </a:effectRef>
+          <a:fontRef idx="minor">
+            <a:schemeClr val="lt1"/>
+          </a:fontRef>
+        </p:style>
         <p:txBody>
-          <a:bodyPr/>
+          <a:bodyPr rtlCol="0" anchor="ctr"/>
           <a:lstStyle/>
           <a:p>
-            <a:r>
-              <a:rPr lang="es-MX" dirty="0"/>
-              <a:t>Código Limpio</a:t>
-            </a:r>
+            <a:pPr algn="ctr"/>
+            <a:endParaRPr lang="en-US"/>
           </a:p>
         </p:txBody>
       </p:sp>
-      <p:sp>
-        <p:nvSpPr>
-          <p:cNvPr id="8" name="Marcador de texto 7">
+      <p:pic>
+        <p:nvPicPr>
+          <p:cNvPr id="4" name="Marcador de contenido 3">
             <a:extLst>
               <a:ext uri="{FF2B5EF4-FFF2-40B4-BE49-F238E27FC236}">
-                <a16:creationId xmlns:a16="http://schemas.microsoft.com/office/drawing/2014/main" id="{88848880-EBEB-4104-AD63-D15D57221A57}"/>
+                <a16:creationId xmlns:a16="http://schemas.microsoft.com/office/drawing/2014/main" id="{8488B3AF-F743-4188-9DAD-B6910E07CD46}"/>
               </a:ext>
             </a:extLst>
           </p:cNvPr>
-          <p:cNvSpPr>
-            <a:spLocks noGrp="1"/>
-          </p:cNvSpPr>
+          <p:cNvPicPr>
+            <a:picLocks noGrp="1" noChangeAspect="1"/>
+          </p:cNvPicPr>
           <p:nvPr>
-            <p:ph type="body" sz="quarter" idx="3"/>
+            <p:ph idx="1"/>
           </p:nvPr>
-        </p:nvSpPr>
-        <p:spPr/>
-        <p:txBody>
-          <a:bodyPr/>
-          <a:lstStyle/>
-          <a:p>
-            <a:r>
-              <a:rPr lang="es-MX" dirty="0"/>
-              <a:t>Desventajas</a:t>
-            </a:r>
-          </a:p>
-        </p:txBody>
-      </p:sp>
-      <p:sp>
-        <p:nvSpPr>
-          <p:cNvPr id="9" name="Marcador de contenido 8">
-            <a:extLst>
-              <a:ext uri="{FF2B5EF4-FFF2-40B4-BE49-F238E27FC236}">
-                <a16:creationId xmlns:a16="http://schemas.microsoft.com/office/drawing/2014/main" id="{2BE81AB2-556A-43F8-9CAC-BD7D088E247E}"/>
-              </a:ext>
-            </a:extLst>
-          </p:cNvPr>
-          <p:cNvSpPr>
-            <a:spLocks noGrp="1"/>
-          </p:cNvSpPr>
-          <p:nvPr>
-            <p:ph sz="quarter" idx="4"/>
-          </p:nvPr>
-        </p:nvSpPr>
-        <p:spPr/>
-        <p:txBody>
-          <a:bodyPr/>
-          <a:lstStyle/>
-          <a:p>
-            <a:r>
-              <a:rPr lang="es-MX" dirty="0"/>
-              <a:t>El </a:t>
-            </a:r>
-            <a:r>
-              <a:rPr lang="es-MX" b="1" dirty="0" err="1"/>
-              <a:t>merge</a:t>
-            </a:r>
-            <a:r>
-              <a:rPr lang="es-MX" dirty="0"/>
-              <a:t> suele ser difícil al momento de integrar</a:t>
-            </a:r>
-          </a:p>
-        </p:txBody>
-      </p:sp>
+        </p:nvPicPr>
+        <p:blipFill>
+          <a:blip r:embed="rId2"/>
+          <a:stretch>
+            <a:fillRect/>
+          </a:stretch>
+        </p:blipFill>
+        <p:spPr>
+          <a:xfrm>
+            <a:off x="943356" y="1293731"/>
+            <a:ext cx="10337292" cy="4264131"/>
+          </a:xfrm>
+          <a:prstGeom prst="rect">
+            <a:avLst/>
+          </a:prstGeom>
+        </p:spPr>
+      </p:pic>
     </p:spTree>
     <p:extLst>
       <p:ext uri="{BB962C8B-B14F-4D97-AF65-F5344CB8AC3E}">
-        <p14:creationId xmlns:p14="http://schemas.microsoft.com/office/powerpoint/2010/main" val="743409911"/>
+        <p14:creationId xmlns:p14="http://schemas.microsoft.com/office/powerpoint/2010/main" val="2091487261"/>
       </p:ext>
     </p:extLst>
   </p:cSld>
@@ -12467,7 +12868,7 @@
           <p:cNvPr id="2" name="Título 1">
             <a:extLst>
               <a:ext uri="{FF2B5EF4-FFF2-40B4-BE49-F238E27FC236}">
-                <a16:creationId xmlns:a16="http://schemas.microsoft.com/office/drawing/2014/main" id="{74E3D249-368B-4E2D-8E8A-FC3696FFB385}"/>
+                <a16:creationId xmlns:a16="http://schemas.microsoft.com/office/drawing/2014/main" id="{E5D662B4-5135-4126-A5D7-AF1E74E7174A}"/>
               </a:ext>
             </a:extLst>
           </p:cNvPr>
@@ -12485,7 +12886,7 @@
           <a:p>
             <a:r>
               <a:rPr lang="es-MX" dirty="0"/>
-              <a:t>Ventajas</a:t>
+              <a:t>Aceptar Invitación</a:t>
             </a:r>
           </a:p>
         </p:txBody>
@@ -12495,7 +12896,7 @@
           <p:cNvPr id="3" name="Marcador de contenido 2">
             <a:extLst>
               <a:ext uri="{FF2B5EF4-FFF2-40B4-BE49-F238E27FC236}">
-                <a16:creationId xmlns:a16="http://schemas.microsoft.com/office/drawing/2014/main" id="{56EF68EF-2F99-45B1-AF53-F422F80D9762}"/>
+                <a16:creationId xmlns:a16="http://schemas.microsoft.com/office/drawing/2014/main" id="{6AF21C79-8301-47DA-978A-EF076CAD0434}"/>
               </a:ext>
             </a:extLst>
           </p:cNvPr>
@@ -12513,15 +12914,69 @@
           <a:p>
             <a:r>
               <a:rPr lang="es-MX" dirty="0"/>
-              <a:t>Multitasking con reparto de trabajo</a:t>
-            </a:r>
+              <a:t>curl -i -u </a:t>
+            </a:r>
+            <a:r>
+              <a:rPr lang="nl-NL" dirty="0"/>
+              <a:t>“</a:t>
+            </a:r>
+            <a:r>
+              <a:rPr lang="nl-NL" b="1" dirty="0">
+                <a:solidFill>
+                  <a:srgbClr val="FF0000"/>
+                </a:solidFill>
+              </a:rPr>
+              <a:t>user:password</a:t>
+            </a:r>
+            <a:r>
+              <a:rPr lang="nl-NL" dirty="0"/>
+              <a:t>"</a:t>
+            </a:r>
+            <a:r>
+              <a:rPr lang="es-MX" dirty="0"/>
+              <a:t> -X PATCH https://api.github.com/user/repository_invitations/</a:t>
+            </a:r>
+            <a:r>
+              <a:rPr lang="es-MX" b="1" dirty="0">
+                <a:solidFill>
+                  <a:srgbClr val="FF0000"/>
+                </a:solidFill>
+              </a:rPr>
+              <a:t>:invID</a:t>
+            </a:r>
+          </a:p>
+          <a:p>
+            <a:endParaRPr lang="es-MX" dirty="0"/>
+          </a:p>
+          <a:p>
+            <a:r>
+              <a:rPr lang="es-MX" dirty="0"/>
+              <a:t>:</a:t>
+            </a:r>
+            <a:r>
+              <a:rPr lang="es-MX" dirty="0" err="1"/>
+              <a:t>invID</a:t>
+            </a:r>
+            <a:r>
+              <a:rPr lang="es-MX" dirty="0"/>
+              <a:t>	id de la invitación que tu compañero te mando</a:t>
+            </a:r>
+          </a:p>
+          <a:p>
+            <a:endParaRPr lang="es-MX" dirty="0"/>
+          </a:p>
+          <a:p>
+            <a:pPr marL="0" indent="0">
+              <a:buNone/>
+            </a:pPr>
+            <a:endParaRPr lang="es-MX" dirty="0"/>
           </a:p>
         </p:txBody>
       </p:sp>
     </p:spTree>
     <p:extLst>
       <p:ext uri="{BB962C8B-B14F-4D97-AF65-F5344CB8AC3E}">
-        <p14:creationId xmlns:p14="http://schemas.microsoft.com/office/powerpoint/2010/main" val="1442290398"/>
+        <p14:creationId xmlns:p14="http://schemas.microsoft.com/office/powerpoint/2010/main" val="2960449454"/>
       </p:ext>
     </p:extLst>
   </p:cSld>
@@ -12553,7 +13008,7 @@
           <p:cNvPr id="2" name="Título 1">
             <a:extLst>
               <a:ext uri="{FF2B5EF4-FFF2-40B4-BE49-F238E27FC236}">
-                <a16:creationId xmlns:a16="http://schemas.microsoft.com/office/drawing/2014/main" id="{2EB46E2F-4F73-437F-A683-5E729CA8F871}"/>
+                <a16:creationId xmlns:a16="http://schemas.microsoft.com/office/drawing/2014/main" id="{20CDF3AE-3D04-4BC9-8AE8-2DD3FD4CB1A7}"/>
               </a:ext>
             </a:extLst>
           </p:cNvPr>
@@ -12571,7 +13026,7 @@
           <a:p>
             <a:r>
               <a:rPr lang="es-MX" dirty="0"/>
-              <a:t>Glosario</a:t>
+              <a:t>Colaborar en el Proyecto</a:t>
             </a:r>
           </a:p>
         </p:txBody>
@@ -12581,7 +13036,7 @@
           <p:cNvPr id="3" name="Marcador de contenido 2">
             <a:extLst>
               <a:ext uri="{FF2B5EF4-FFF2-40B4-BE49-F238E27FC236}">
-                <a16:creationId xmlns:a16="http://schemas.microsoft.com/office/drawing/2014/main" id="{0905EA7A-D1A7-4C25-9700-88ADD7FB79A6}"/>
+                <a16:creationId xmlns:a16="http://schemas.microsoft.com/office/drawing/2014/main" id="{3DE858AE-8B08-450B-891A-C2B044CC6F5F}"/>
               </a:ext>
             </a:extLst>
           </p:cNvPr>
@@ -12599,27 +13054,122 @@
           <a:p>
             <a:r>
               <a:rPr lang="es-MX" dirty="0"/>
-              <a:t>(Branch): una rama de desarrollo.</a:t>
-            </a:r>
-          </a:p>
-          <a:p>
+              <a:t>git clone </a:t>
+            </a:r>
+            <a:r>
+              <a:rPr lang="es-MX" dirty="0">
+                <a:solidFill>
+                  <a:srgbClr val="404040"/>
+                </a:solidFill>
+              </a:rPr>
+              <a:t>https://github.com</a:t>
+            </a:r>
             <a:r>
               <a:rPr lang="es-MX" dirty="0"/>
-              <a:t>(HEAD -&gt; master): Significa en donde estamos ahora mismo y de que rama</a:t>
-            </a:r>
-          </a:p>
-          <a:p>
+              <a:t>/</a:t>
+            </a:r>
+            <a:r>
+              <a:rPr lang="es-MX" b="1" dirty="0">
+                <a:solidFill>
+                  <a:srgbClr val="FF0000"/>
+                </a:solidFill>
+              </a:rPr>
+              <a:t>:owner</a:t>
+            </a:r>
             <a:r>
               <a:rPr lang="es-MX" dirty="0"/>
-              <a:t>(</a:t>
-            </a:r>
-            <a:r>
-              <a:rPr lang="es-MX" dirty="0" err="1"/>
-              <a:t>Merge</a:t>
-            </a:r>
-            <a:r>
-              <a:rPr lang="es-MX" dirty="0"/>
-              <a:t>): Juntar una rama con otra.</a:t>
+              <a:t>/</a:t>
+            </a:r>
+            <a:r>
+              <a:rPr lang="es-MX" b="1" dirty="0">
+                <a:solidFill>
+                  <a:srgbClr val="FF0000"/>
+                </a:solidFill>
+              </a:rPr>
+              <a:t>:repoName </a:t>
+            </a:r>
+          </a:p>
+          <a:p>
+            <a:endParaRPr lang="es-MX" b="1" dirty="0">
+              <a:solidFill>
+                <a:srgbClr val="FF0000"/>
+              </a:solidFill>
+            </a:endParaRPr>
+          </a:p>
+          <a:p>
+            <a:r>
+              <a:rPr lang="es-MX" dirty="0">
+                <a:solidFill>
+                  <a:srgbClr val="404040"/>
+                </a:solidFill>
+              </a:rPr>
+              <a:t>:</a:t>
+            </a:r>
+            <a:r>
+              <a:rPr lang="es-MX" dirty="0" err="1">
+                <a:solidFill>
+                  <a:srgbClr val="404040"/>
+                </a:solidFill>
+              </a:rPr>
+              <a:t>owner</a:t>
+            </a:r>
+            <a:r>
+              <a:rPr lang="es-MX" dirty="0">
+                <a:solidFill>
+                  <a:srgbClr val="404040"/>
+                </a:solidFill>
+              </a:rPr>
+              <a:t>		Propietario del repositorio</a:t>
+            </a:r>
+          </a:p>
+          <a:p>
+            <a:r>
+              <a:rPr lang="es-MX" dirty="0">
+                <a:solidFill>
+                  <a:srgbClr val="404040"/>
+                </a:solidFill>
+              </a:rPr>
+              <a:t>:</a:t>
+            </a:r>
+            <a:r>
+              <a:rPr lang="es-MX" dirty="0" err="1">
+                <a:solidFill>
+                  <a:srgbClr val="404040"/>
+                </a:solidFill>
+              </a:rPr>
+              <a:t>repoName</a:t>
+            </a:r>
+            <a:r>
+              <a:rPr lang="es-MX" dirty="0">
+                <a:solidFill>
+                  <a:srgbClr val="404040"/>
+                </a:solidFill>
+              </a:rPr>
+              <a:t>	Nombre del repositorio</a:t>
+            </a:r>
+          </a:p>
+          <a:p>
+            <a:endParaRPr lang="es-MX" dirty="0">
+              <a:solidFill>
+                <a:srgbClr val="404040"/>
+              </a:solidFill>
+            </a:endParaRPr>
+          </a:p>
+          <a:p>
+            <a:endParaRPr lang="es-MX" dirty="0">
+              <a:solidFill>
+                <a:srgbClr val="404040"/>
+              </a:solidFill>
+            </a:endParaRPr>
+          </a:p>
+          <a:p>
+            <a:r>
+              <a:rPr lang="es-MX" dirty="0">
+                <a:solidFill>
+                  <a:srgbClr val="404040"/>
+                </a:solidFill>
+              </a:rPr>
+              <a:t>* Nota (No se necesita ser colaborador para poder clonar los proyectos).</a:t>
             </a:r>
           </a:p>
         </p:txBody>
@@ -12627,7 +13177,7 @@
     </p:spTree>
     <p:extLst>
       <p:ext uri="{BB962C8B-B14F-4D97-AF65-F5344CB8AC3E}">
-        <p14:creationId xmlns:p14="http://schemas.microsoft.com/office/powerpoint/2010/main" val="3253257219"/>
+        <p14:creationId xmlns:p14="http://schemas.microsoft.com/office/powerpoint/2010/main" val="600121139"/>
       </p:ext>
     </p:extLst>
   </p:cSld>
@@ -12659,7 +13209,7 @@
           <p:cNvPr id="2" name="Título 1">
             <a:extLst>
               <a:ext uri="{FF2B5EF4-FFF2-40B4-BE49-F238E27FC236}">
-                <a16:creationId xmlns:a16="http://schemas.microsoft.com/office/drawing/2014/main" id="{84757644-0852-4360-B31C-C93F9D5FA13C}"/>
+                <a16:creationId xmlns:a16="http://schemas.microsoft.com/office/drawing/2014/main" id="{41FBFCCA-1242-466A-A522-CAB0B5421C1A}"/>
               </a:ext>
             </a:extLst>
           </p:cNvPr>
@@ -12677,7 +13227,7 @@
           <a:p>
             <a:r>
               <a:rPr lang="es-MX" dirty="0"/>
-              <a:t>Siguiente nivel de GIT.</a:t>
+              <a:t>Agregar archivos en el repositorio</a:t>
             </a:r>
           </a:p>
         </p:txBody>
@@ -12687,7 +13237,7 @@
           <p:cNvPr id="3" name="Marcador de contenido 2">
             <a:extLst>
               <a:ext uri="{FF2B5EF4-FFF2-40B4-BE49-F238E27FC236}">
-                <a16:creationId xmlns:a16="http://schemas.microsoft.com/office/drawing/2014/main" id="{7FFD3340-E2EA-4E2C-8430-C7344720A56E}"/>
+                <a16:creationId xmlns:a16="http://schemas.microsoft.com/office/drawing/2014/main" id="{F4B1A559-620E-405D-8BE5-3418693A5307}"/>
               </a:ext>
             </a:extLst>
           </p:cNvPr>
@@ -12703,6 +13253,108 @@
           <a:bodyPr/>
           <a:lstStyle/>
           <a:p>
+            <a:pPr marL="457200" indent="-457200">
+              <a:buFont typeface="+mj-lt"/>
+              <a:buAutoNum type="arabicPeriod"/>
+            </a:pPr>
+            <a:r>
+              <a:rPr lang="es-MX" dirty="0"/>
+              <a:t>echo “Hola mundo" &gt;&gt; holaMundo.txt </a:t>
+            </a:r>
+          </a:p>
+          <a:p>
+            <a:pPr marL="749808" lvl="1" indent="-457200">
+              <a:buFont typeface="+mj-lt"/>
+              <a:buAutoNum type="arabicPeriod"/>
+            </a:pPr>
+            <a:r>
+              <a:rPr lang="es-MX" dirty="0"/>
+              <a:t>crear un archivo en la carpeta del repositorio</a:t>
+            </a:r>
+          </a:p>
+          <a:p>
+            <a:pPr marL="457200" indent="-457200">
+              <a:buFont typeface="+mj-lt"/>
+              <a:buAutoNum type="arabicPeriod"/>
+            </a:pPr>
+            <a:r>
+              <a:rPr lang="es-MX" dirty="0"/>
+              <a:t>git status </a:t>
+            </a:r>
+            <a:r>
+              <a:rPr lang="es-MX" dirty="0">
+                <a:solidFill>
+                  <a:srgbClr val="0070C0"/>
+                </a:solidFill>
+              </a:rPr>
+              <a:t>*Solo para visualizar los documentos que cambiaron es opcional</a:t>
+            </a:r>
+          </a:p>
+          <a:p>
+            <a:pPr marL="457200" indent="-457200">
+              <a:buFont typeface="+mj-lt"/>
+              <a:buAutoNum type="arabicPeriod"/>
+            </a:pPr>
+            <a:r>
+              <a:rPr lang="es-MX" dirty="0"/>
+              <a:t>git add .	</a:t>
+            </a:r>
+          </a:p>
+          <a:p>
+            <a:pPr marL="749808" lvl="1" indent="-457200">
+              <a:buFont typeface="+mj-lt"/>
+              <a:buAutoNum type="arabicPeriod"/>
+            </a:pPr>
+            <a:r>
+              <a:rPr lang="es-MX" dirty="0"/>
+              <a:t>git add </a:t>
+            </a:r>
+            <a:r>
+              <a:rPr lang="es-MX" b="1" dirty="0">
+                <a:solidFill>
+                  <a:srgbClr val="FF0000"/>
+                </a:solidFill>
+              </a:rPr>
+              <a:t>:</a:t>
+            </a:r>
+            <a:r>
+              <a:rPr lang="es-MX" b="1" dirty="0" err="1">
+                <a:solidFill>
+                  <a:srgbClr val="FF0000"/>
+                </a:solidFill>
+              </a:rPr>
+              <a:t>fullPathArchivo</a:t>
+            </a:r>
+            <a:endParaRPr lang="es-MX" b="1" dirty="0">
+              <a:solidFill>
+                <a:srgbClr val="FF0000"/>
+              </a:solidFill>
+            </a:endParaRPr>
+          </a:p>
+          <a:p>
+            <a:pPr marL="457200" indent="-457200">
+              <a:buFont typeface="+mj-lt"/>
+              <a:buAutoNum type="arabicPeriod"/>
+            </a:pPr>
+            <a:r>
+              <a:rPr lang="es-MX" dirty="0"/>
+              <a:t>git commit –m “Comentario del commit”</a:t>
+            </a:r>
+          </a:p>
+          <a:p>
+            <a:pPr marL="457200" indent="-457200">
+              <a:buFont typeface="+mj-lt"/>
+              <a:buAutoNum type="arabicPeriod"/>
+            </a:pPr>
+            <a:r>
+              <a:rPr lang="es-MX" dirty="0"/>
+              <a:t>git push</a:t>
+            </a:r>
+          </a:p>
+          <a:p>
+            <a:pPr marL="0" indent="0">
+              <a:buNone/>
+            </a:pPr>
             <a:endParaRPr lang="es-MX" dirty="0"/>
           </a:p>
         </p:txBody>
@@ -12710,7 +13362,7 @@
     </p:spTree>
     <p:extLst>
       <p:ext uri="{BB962C8B-B14F-4D97-AF65-F5344CB8AC3E}">
-        <p14:creationId xmlns:p14="http://schemas.microsoft.com/office/powerpoint/2010/main" val="1653864675"/>
+        <p14:creationId xmlns:p14="http://schemas.microsoft.com/office/powerpoint/2010/main" val="4245653520"/>
       </p:ext>
     </p:extLst>
   </p:cSld>
@@ -12767,10 +13419,129 @@
       </p:sp>
       <p:sp>
         <p:nvSpPr>
+          <p:cNvPr id="5" name="Marcador de texto 4">
+            <a:extLst>
+              <a:ext uri="{FF2B5EF4-FFF2-40B4-BE49-F238E27FC236}">
+                <a16:creationId xmlns:a16="http://schemas.microsoft.com/office/drawing/2014/main" id="{7B89B27E-6B05-41D5-89A5-0AF5E2BCE87D}"/>
+              </a:ext>
+            </a:extLst>
+          </p:cNvPr>
+          <p:cNvSpPr>
+            <a:spLocks noGrp="1"/>
+          </p:cNvSpPr>
+          <p:nvPr>
+            <p:ph type="body" sz="half" idx="2"/>
+          </p:nvPr>
+        </p:nvSpPr>
+        <p:spPr/>
+        <p:txBody>
+          <a:bodyPr/>
+          <a:lstStyle/>
+          <a:p>
+            <a:endParaRPr lang="es-MX" dirty="0"/>
+          </a:p>
+        </p:txBody>
+      </p:sp>
+      <p:pic>
+        <p:nvPicPr>
+          <p:cNvPr id="13" name="Marcador de posición de imagen 12">
+            <a:extLst>
+              <a:ext uri="{FF2B5EF4-FFF2-40B4-BE49-F238E27FC236}">
+                <a16:creationId xmlns:a16="http://schemas.microsoft.com/office/drawing/2014/main" id="{958EBC5E-FF84-4BEE-B411-41125500364A}"/>
+              </a:ext>
+            </a:extLst>
+          </p:cNvPr>
+          <p:cNvPicPr>
+            <a:picLocks noGrp="1" noChangeAspect="1"/>
+          </p:cNvPicPr>
+          <p:nvPr>
+            <p:ph type="pic" idx="1"/>
+          </p:nvPr>
+        </p:nvPicPr>
+        <p:blipFill>
+          <a:blip r:embed="rId2">
+            <a:extLst>
+              <a:ext uri="{28A0092B-C50C-407E-A947-70E740481C1C}">
+                <a14:useLocalDpi xmlns:a14="http://schemas.microsoft.com/office/drawing/2010/main" val="0"/>
+              </a:ext>
+            </a:extLst>
+          </a:blip>
+          <a:srcRect t="11607" b="11607"/>
+          <a:stretch>
+            <a:fillRect/>
+          </a:stretch>
+        </p:blipFill>
+        <p:spPr>
+          <a:xfrm>
+            <a:off x="15" y="0"/>
+            <a:ext cx="12191985" cy="4915075"/>
+          </a:xfrm>
+        </p:spPr>
+      </p:pic>
+    </p:spTree>
+    <p:extLst>
+      <p:ext uri="{BB962C8B-B14F-4D97-AF65-F5344CB8AC3E}">
+        <p14:creationId xmlns:p14="http://schemas.microsoft.com/office/powerpoint/2010/main" val="2178470935"/>
+      </p:ext>
+    </p:extLst>
+  </p:cSld>
+  <p:clrMapOvr>
+    <a:masterClrMapping/>
+  </p:clrMapOvr>
+</p:sld>
+</file>
+
+<file path=ppt/slides/slide20.xml><?xml version="1.0" encoding="utf-8"?>
+<p:sld xmlns:a="http://schemas.openxmlformats.org/drawingml/2006/main" xmlns:r="http://schemas.openxmlformats.org/officeDocument/2006/relationships" xmlns:p="http://schemas.openxmlformats.org/presentationml/2006/main">
+  <p:cSld>
+    <p:spTree>
+      <p:nvGrpSpPr>
+        <p:cNvPr id="1" name=""/>
+        <p:cNvGrpSpPr/>
+        <p:nvPr/>
+      </p:nvGrpSpPr>
+      <p:grpSpPr>
+        <a:xfrm>
+          <a:off x="0" y="0"/>
+          <a:ext cx="0" cy="0"/>
+          <a:chOff x="0" y="0"/>
+          <a:chExt cx="0" cy="0"/>
+        </a:xfrm>
+      </p:grpSpPr>
+      <p:sp>
+        <p:nvSpPr>
+          <p:cNvPr id="2" name="Título 1">
+            <a:extLst>
+              <a:ext uri="{FF2B5EF4-FFF2-40B4-BE49-F238E27FC236}">
+                <a16:creationId xmlns:a16="http://schemas.microsoft.com/office/drawing/2014/main" id="{6FB28050-4A6A-4911-B3C3-BCB8B86F7AED}"/>
+              </a:ext>
+            </a:extLst>
+          </p:cNvPr>
+          <p:cNvSpPr>
+            <a:spLocks noGrp="1"/>
+          </p:cNvSpPr>
+          <p:nvPr>
+            <p:ph type="title"/>
+          </p:nvPr>
+        </p:nvSpPr>
+        <p:spPr/>
+        <p:txBody>
+          <a:bodyPr/>
+          <a:lstStyle/>
+          <a:p>
+            <a:r>
+              <a:rPr lang="es-MX" dirty="0"/>
+              <a:t>Recibir los cambios</a:t>
+            </a:r>
+          </a:p>
+        </p:txBody>
+      </p:sp>
+      <p:sp>
+        <p:nvSpPr>
           <p:cNvPr id="3" name="Marcador de contenido 2">
             <a:extLst>
               <a:ext uri="{FF2B5EF4-FFF2-40B4-BE49-F238E27FC236}">
-                <a16:creationId xmlns:a16="http://schemas.microsoft.com/office/drawing/2014/main" id="{2FF5534C-1F86-4369-B8F4-1BE40C0A207F}"/>
+                <a16:creationId xmlns:a16="http://schemas.microsoft.com/office/drawing/2014/main" id="{5D11A53A-442D-432D-857E-81D84ADAD925}"/>
               </a:ext>
             </a:extLst>
           </p:cNvPr>
@@ -12786,17 +13557,161 @@
           <a:bodyPr/>
           <a:lstStyle/>
           <a:p>
-            <a:pPr marL="0" indent="0">
-              <a:buNone/>
+            <a:pPr marL="457200" indent="-457200">
+              <a:buFont typeface="+mj-lt"/>
+              <a:buAutoNum type="arabicPeriod"/>
             </a:pPr>
-            <a:endParaRPr lang="es-MX" dirty="0"/>
+            <a:r>
+              <a:rPr lang="es-MX" dirty="0"/>
+              <a:t>git push</a:t>
+            </a:r>
+          </a:p>
+          <a:p>
+            <a:pPr marL="749808" lvl="1" indent="-457200">
+              <a:buFont typeface="+mj-lt"/>
+              <a:buAutoNum type="arabicPeriod"/>
+            </a:pPr>
+            <a:r>
+              <a:rPr lang="es-MX" dirty="0"/>
+              <a:t>Si existen conflictos se necesita decidir por los archivos.</a:t>
+            </a:r>
+          </a:p>
+          <a:p>
+            <a:pPr marL="749808" lvl="1" indent="-457200">
+              <a:buFont typeface="+mj-lt"/>
+              <a:buAutoNum type="arabicPeriod"/>
+            </a:pPr>
+            <a:r>
+              <a:rPr lang="es-MX" dirty="0"/>
+              <a:t>Se puede ocupar una herramienta como un </a:t>
+            </a:r>
+            <a:r>
+              <a:rPr lang="es-MX" i="1" dirty="0"/>
+              <a:t>git </a:t>
+            </a:r>
+            <a:r>
+              <a:rPr lang="es-MX" i="1" dirty="0" err="1"/>
+              <a:t>diff</a:t>
+            </a:r>
+            <a:r>
+              <a:rPr lang="es-MX" i="1" dirty="0"/>
+              <a:t> </a:t>
+            </a:r>
+            <a:r>
+              <a:rPr lang="es-MX" b="1" i="1" dirty="0">
+                <a:solidFill>
+                  <a:srgbClr val="FF0000"/>
+                </a:solidFill>
+              </a:rPr>
+              <a:t>:</a:t>
+            </a:r>
+            <a:r>
+              <a:rPr lang="es-MX" b="1" i="1" dirty="0" err="1">
+                <a:solidFill>
+                  <a:srgbClr val="FF0000"/>
+                </a:solidFill>
+              </a:rPr>
+              <a:t>fileName</a:t>
+            </a:r>
+            <a:endParaRPr lang="es-MX" b="1" i="1" dirty="0">
+              <a:solidFill>
+                <a:srgbClr val="FF0000"/>
+              </a:solidFill>
+            </a:endParaRPr>
+          </a:p>
+          <a:p>
+            <a:pPr marL="457200" indent="-457200">
+              <a:buFont typeface="+mj-lt"/>
+              <a:buAutoNum type="arabicPeriod"/>
+            </a:pPr>
+            <a:r>
+              <a:rPr lang="es-MX" dirty="0"/>
+              <a:t>Se puede hacer un </a:t>
+            </a:r>
+            <a:r>
+              <a:rPr lang="es-MX" b="1" dirty="0">
+                <a:solidFill>
+                  <a:srgbClr val="FF0000"/>
+                </a:solidFill>
+              </a:rPr>
+              <a:t>MERGE</a:t>
+            </a:r>
+            <a:r>
+              <a:rPr lang="es-MX" dirty="0"/>
+              <a:t> o un </a:t>
+            </a:r>
+            <a:r>
+              <a:rPr lang="es-MX" b="1" dirty="0">
+                <a:solidFill>
+                  <a:srgbClr val="FF0000"/>
+                </a:solidFill>
+              </a:rPr>
+              <a:t>FAST FORWARD</a:t>
+            </a:r>
+            <a:r>
+              <a:rPr lang="es-MX" dirty="0"/>
+              <a:t>.</a:t>
+            </a:r>
+          </a:p>
+          <a:p>
+            <a:pPr marL="457200" indent="-457200">
+              <a:buFont typeface="+mj-lt"/>
+              <a:buAutoNum type="arabicPeriod"/>
+            </a:pPr>
+            <a:r>
+              <a:rPr lang="es-MX" dirty="0"/>
+              <a:t>Evita hacer a toda costa las acciones </a:t>
+            </a:r>
+            <a:r>
+              <a:rPr lang="es-MX" b="1" dirty="0">
+                <a:solidFill>
+                  <a:srgbClr val="FF0000"/>
+                </a:solidFill>
+              </a:rPr>
+              <a:t>REBASE </a:t>
+            </a:r>
+            <a:r>
+              <a:rPr lang="es-MX" dirty="0">
+                <a:solidFill>
+                  <a:srgbClr val="404040"/>
+                </a:solidFill>
+              </a:rPr>
+              <a:t>Suelen ser </a:t>
+            </a:r>
+            <a:r>
+              <a:rPr lang="es-MX" dirty="0">
+                <a:solidFill>
+                  <a:srgbClr val="FF0000"/>
+                </a:solidFill>
+              </a:rPr>
+              <a:t>acciones destructivas </a:t>
+            </a:r>
+            <a:r>
+              <a:rPr lang="es-MX" dirty="0">
+                <a:solidFill>
+                  <a:srgbClr val="404040"/>
+                </a:solidFill>
+              </a:rPr>
+              <a:t>que terminan por borrar tus archivos del repositorio.</a:t>
+            </a:r>
+          </a:p>
+          <a:p>
+            <a:pPr marL="457200" indent="-457200">
+              <a:buFont typeface="+mj-lt"/>
+              <a:buAutoNum type="arabicPeriod"/>
+            </a:pPr>
+            <a:endParaRPr lang="es-MX" b="1" dirty="0">
+              <a:solidFill>
+                <a:srgbClr val="404040"/>
+              </a:solidFill>
+            </a:endParaRPr>
           </a:p>
         </p:txBody>
       </p:sp>
     </p:spTree>
     <p:extLst>
       <p:ext uri="{BB962C8B-B14F-4D97-AF65-F5344CB8AC3E}">
-        <p14:creationId xmlns:p14="http://schemas.microsoft.com/office/powerpoint/2010/main" val="2178470935"/>
+        <p14:creationId xmlns:p14="http://schemas.microsoft.com/office/powerpoint/2010/main" val="3195377996"/>
       </p:ext>
     </p:extLst>
   </p:cSld>
@@ -12806,7 +13721,7 @@
 </p:sld>
 </file>
 
-<file path=ppt/slides/slide20.xml><?xml version="1.0" encoding="utf-8"?>
+<file path=ppt/slides/slide21.xml><?xml version="1.0" encoding="utf-8"?>
 <p:sld xmlns:a="http://schemas.openxmlformats.org/drawingml/2006/main" xmlns:r="http://schemas.openxmlformats.org/officeDocument/2006/relationships" xmlns:p="http://schemas.openxmlformats.org/presentationml/2006/main">
   <p:cSld>
     <p:spTree>
@@ -12928,6 +13843,19 @@
             <a:pPr marL="201168" lvl="1" indent="0">
               <a:buNone/>
             </a:pPr>
+            <a:r>
+              <a:rPr lang="es-MX" dirty="0"/>
+              <a:t>API REST GIT</a:t>
+            </a:r>
+          </a:p>
+          <a:p>
+            <a:pPr lvl="1"/>
+            <a:r>
+              <a:rPr lang="es-MX" dirty="0">
+                <a:hlinkClick r:id="rId5"/>
+              </a:rPr>
+              <a:t>https://developer.github.com/v3/</a:t>
+            </a:r>
             <a:endParaRPr lang="es-MX" dirty="0"/>
           </a:p>
           <a:p>

</xml_diff>

<commit_message>
Cambios para el inicio de la presentación
</commit_message>
<xml_diff>
--- a/Git.pptx
+++ b/Git.pptx
@@ -5,7 +5,7 @@
     <p:sldMasterId id="2147483660" r:id="rId1"/>
   </p:sldMasterIdLst>
   <p:handoutMasterIdLst>
-    <p:handoutMasterId r:id="rId23"/>
+    <p:handoutMasterId r:id="rId29"/>
   </p:handoutMasterIdLst>
   <p:sldIdLst>
     <p:sldId id="256" r:id="rId2"/>
@@ -26,9 +26,15 @@
     <p:sldId id="283" r:id="rId17"/>
     <p:sldId id="284" r:id="rId18"/>
     <p:sldId id="285" r:id="rId19"/>
-    <p:sldId id="286" r:id="rId20"/>
-    <p:sldId id="287" r:id="rId21"/>
-    <p:sldId id="262" r:id="rId22"/>
+    <p:sldId id="289" r:id="rId20"/>
+    <p:sldId id="290" r:id="rId21"/>
+    <p:sldId id="291" r:id="rId22"/>
+    <p:sldId id="286" r:id="rId23"/>
+    <p:sldId id="292" r:id="rId24"/>
+    <p:sldId id="293" r:id="rId25"/>
+    <p:sldId id="294" r:id="rId26"/>
+    <p:sldId id="295" r:id="rId27"/>
+    <p:sldId id="262" r:id="rId28"/>
   </p:sldIdLst>
   <p:sldSz cx="12192000" cy="6858000"/>
   <p:notesSz cx="6858000" cy="9144000"/>
@@ -128,6 +134,57 @@
     </a:lvl9pPr>
   </p:defaultTextStyle>
   <p:extLst>
+    <p:ext uri="{521415D9-36F7-43E2-AB2F-B90AF26B5E84}">
+      <p14:sectionLst xmlns:p14="http://schemas.microsoft.com/office/powerpoint/2010/main">
+        <p14:section name="Inicio de la presentación" id="{A0197FDC-9EE8-453B-A3B7-A9B1FD78F0D0}">
+          <p14:sldIdLst>
+            <p14:sldId id="256"/>
+            <p14:sldId id="267"/>
+          </p14:sldIdLst>
+        </p14:section>
+        <p14:section name="Presentación" id="{48C3D95F-CF3D-4003-889E-ADADC7FC8115}">
+          <p14:sldIdLst>
+            <p14:sldId id="257"/>
+            <p14:sldId id="274"/>
+            <p14:sldId id="272"/>
+            <p14:sldId id="275"/>
+            <p14:sldId id="276"/>
+            <p14:sldId id="277"/>
+            <p14:sldId id="278"/>
+            <p14:sldId id="266"/>
+            <p14:sldId id="270"/>
+            <p14:sldId id="279"/>
+          </p14:sldIdLst>
+        </p14:section>
+        <p14:section name="Creancion de Repo desde comandos" id="{E1E5213A-E656-4BEA-9B4B-CF31563B4BF4}">
+          <p14:sldIdLst>
+            <p14:sldId id="268"/>
+            <p14:sldId id="281"/>
+            <p14:sldId id="282"/>
+            <p14:sldId id="283"/>
+            <p14:sldId id="284"/>
+            <p14:sldId id="285"/>
+          </p14:sldIdLst>
+        </p14:section>
+        <p14:section name="Casos de Estudio" id="{693E11A8-26A1-4899-8156-3DC434230277}">
+          <p14:sldIdLst>
+            <p14:sldId id="289"/>
+            <p14:sldId id="290"/>
+            <p14:sldId id="291"/>
+            <p14:sldId id="286"/>
+            <p14:sldId id="292"/>
+            <p14:sldId id="293"/>
+            <p14:sldId id="294"/>
+            <p14:sldId id="295"/>
+          </p14:sldIdLst>
+        </p14:section>
+        <p14:section name="Referencias" id="{CAA8166D-6728-40A9-A868-AE342551B3AC}">
+          <p14:sldIdLst>
+            <p14:sldId id="262"/>
+          </p14:sldIdLst>
+        </p14:section>
+      </p14:sectionLst>
+    </p:ext>
     <p:ext uri="{EFAFB233-063F-42B5-8137-9DF3F51BA10A}">
       <p15:sldGuideLst xmlns:p15="http://schemas.microsoft.com/office/powerpoint/2012/main">
         <p15:guide id="1" orient="horz" pos="2160" userDrawn="1">
@@ -2185,8 +2242,12 @@
         <a:lstStyle/>
         <a:p>
           <a:r>
+            <a:rPr lang="es-MX" dirty="0" err="1"/>
+            <a:t>Pull</a:t>
+          </a:r>
+          <a:r>
             <a:rPr lang="es-MX" dirty="0"/>
-            <a:t>Pull(Incorporar)</a:t>
+            <a:t> (Descargar)</a:t>
           </a:r>
         </a:p>
       </dgm:t>
@@ -2221,8 +2282,12 @@
         <a:lstStyle/>
         <a:p>
           <a:r>
+            <a:rPr lang="es-MX" dirty="0" err="1"/>
+            <a:t>Push</a:t>
+          </a:r>
+          <a:r>
             <a:rPr lang="es-MX" dirty="0"/>
-            <a:t>Push (Descargar)</a:t>
+            <a:t> (Incorporar)</a:t>
           </a:r>
         </a:p>
       </dgm:t>
@@ -3892,8 +3957,12 @@
             <a:buNone/>
           </a:pPr>
           <a:r>
+            <a:rPr lang="es-MX" sz="2600" kern="1200" dirty="0" err="1"/>
+            <a:t>Pull</a:t>
+          </a:r>
+          <a:r>
             <a:rPr lang="es-MX" sz="2600" kern="1200" dirty="0"/>
-            <a:t>Pull(Incorporar)</a:t>
+            <a:t> (Descargar)</a:t>
           </a:r>
         </a:p>
       </dsp:txBody>
@@ -4001,8 +4070,12 @@
             <a:buNone/>
           </a:pPr>
           <a:r>
+            <a:rPr lang="es-MX" sz="2600" kern="1200" dirty="0" err="1"/>
+            <a:t>Push</a:t>
+          </a:r>
+          <a:r>
             <a:rPr lang="es-MX" sz="2600" kern="1200" dirty="0"/>
-            <a:t>Push (Descargar)</a:t>
+            <a:t> (Incorporar)</a:t>
           </a:r>
         </a:p>
       </dsp:txBody>
@@ -6950,7 +7023,7 @@
           <a:p>
             <a:fld id="{8291C6A9-4179-4CB7-8393-8AE8219F3168}" type="datetimeFigureOut">
               <a:rPr lang="es-MX" smtClean="0"/>
-              <a:t>24/04/2018</a:t>
+              <a:t>02/02/2020</a:t>
             </a:fld>
             <a:endParaRPr lang="es-MX"/>
           </a:p>
@@ -7271,7 +7344,7 @@
           <a:p>
             <a:fld id="{688B3D32-BF94-4C94-B4A6-783CF8FA0F83}" type="datetimeFigureOut">
               <a:rPr lang="es-MX" smtClean="0"/>
-              <a:t>24/04/2018</a:t>
+              <a:t>02/02/2020</a:t>
             </a:fld>
             <a:endParaRPr lang="es-MX"/>
           </a:p>
@@ -7706,7 +7779,7 @@
           <a:p>
             <a:fld id="{688B3D32-BF94-4C94-B4A6-783CF8FA0F83}" type="datetimeFigureOut">
               <a:rPr lang="es-MX" smtClean="0"/>
-              <a:t>24/04/2018</a:t>
+              <a:t>02/02/2020</a:t>
             </a:fld>
             <a:endParaRPr lang="es-MX"/>
           </a:p>
@@ -7876,7 +7949,7 @@
           <a:p>
             <a:fld id="{688B3D32-BF94-4C94-B4A6-783CF8FA0F83}" type="datetimeFigureOut">
               <a:rPr lang="es-MX" smtClean="0"/>
-              <a:t>24/04/2018</a:t>
+              <a:t>02/02/2020</a:t>
             </a:fld>
             <a:endParaRPr lang="es-MX"/>
           </a:p>
@@ -8132,7 +8205,7 @@
           <a:p>
             <a:fld id="{688B3D32-BF94-4C94-B4A6-783CF8FA0F83}" type="datetimeFigureOut">
               <a:rPr lang="es-MX" smtClean="0"/>
-              <a:t>24/04/2018</a:t>
+              <a:t>02/02/2020</a:t>
             </a:fld>
             <a:endParaRPr lang="es-MX"/>
           </a:p>
@@ -8306,7 +8379,7 @@
           <a:p>
             <a:fld id="{688B3D32-BF94-4C94-B4A6-783CF8FA0F83}" type="datetimeFigureOut">
               <a:rPr lang="es-MX" smtClean="0"/>
-              <a:t>24/04/2018</a:t>
+              <a:t>02/02/2020</a:t>
             </a:fld>
             <a:endParaRPr lang="es-MX"/>
           </a:p>
@@ -8649,7 +8722,7 @@
           <a:p>
             <a:fld id="{688B3D32-BF94-4C94-B4A6-783CF8FA0F83}" type="datetimeFigureOut">
               <a:rPr lang="es-MX" smtClean="0"/>
-              <a:t>24/04/2018</a:t>
+              <a:t>02/02/2020</a:t>
             </a:fld>
             <a:endParaRPr lang="es-MX"/>
           </a:p>
@@ -8960,7 +9033,7 @@
           <a:p>
             <a:fld id="{688B3D32-BF94-4C94-B4A6-783CF8FA0F83}" type="datetimeFigureOut">
               <a:rPr lang="es-MX" smtClean="0"/>
-              <a:t>24/04/2018</a:t>
+              <a:t>02/02/2020</a:t>
             </a:fld>
             <a:endParaRPr lang="es-MX"/>
           </a:p>
@@ -9339,7 +9412,7 @@
           <a:p>
             <a:fld id="{688B3D32-BF94-4C94-B4A6-783CF8FA0F83}" type="datetimeFigureOut">
               <a:rPr lang="es-MX" smtClean="0"/>
-              <a:t>24/04/2018</a:t>
+              <a:t>02/02/2020</a:t>
             </a:fld>
             <a:endParaRPr lang="es-MX"/>
           </a:p>
@@ -9457,7 +9530,7 @@
           <a:p>
             <a:fld id="{688B3D32-BF94-4C94-B4A6-783CF8FA0F83}" type="datetimeFigureOut">
               <a:rPr lang="es-MX" smtClean="0"/>
-              <a:t>24/04/2018</a:t>
+              <a:t>02/02/2020</a:t>
             </a:fld>
             <a:endParaRPr lang="es-MX"/>
           </a:p>
@@ -9628,7 +9701,7 @@
           <a:p>
             <a:fld id="{688B3D32-BF94-4C94-B4A6-783CF8FA0F83}" type="datetimeFigureOut">
               <a:rPr lang="es-MX" smtClean="0"/>
-              <a:t>24/04/2018</a:t>
+              <a:t>02/02/2020</a:t>
             </a:fld>
             <a:endParaRPr lang="es-MX"/>
           </a:p>
@@ -9807,7 +9880,7 @@
           <a:p>
             <a:fld id="{688B3D32-BF94-4C94-B4A6-783CF8FA0F83}" type="datetimeFigureOut">
               <a:rPr lang="es-MX" smtClean="0"/>
-              <a:t>24/04/2018</a:t>
+              <a:t>02/02/2020</a:t>
             </a:fld>
             <a:endParaRPr lang="es-MX"/>
           </a:p>
@@ -10191,7 +10264,7 @@
           <a:p>
             <a:fld id="{688B3D32-BF94-4C94-B4A6-783CF8FA0F83}" type="datetimeFigureOut">
               <a:rPr lang="es-MX" smtClean="0"/>
-              <a:t>24/04/2018</a:t>
+              <a:t>02/02/2020</a:t>
             </a:fld>
             <a:endParaRPr lang="es-MX"/>
           </a:p>
@@ -10499,7 +10572,7 @@
           <a:p>
             <a:fld id="{688B3D32-BF94-4C94-B4A6-783CF8FA0F83}" type="datetimeFigureOut">
               <a:rPr lang="es-MX" smtClean="0"/>
-              <a:t>24/04/2018</a:t>
+              <a:t>02/02/2020</a:t>
             </a:fld>
             <a:endParaRPr lang="es-MX"/>
           </a:p>
@@ -11291,7 +11364,7 @@
             <p:ph idx="1"/>
             <p:extLst>
               <p:ext uri="{D42A27DB-BD31-4B8C-83A1-F6EECF244321}">
-                <p14:modId xmlns:p14="http://schemas.microsoft.com/office/powerpoint/2010/main" val="4121928995"/>
+                <p14:modId xmlns:p14="http://schemas.microsoft.com/office/powerpoint/2010/main" val="3809126024"/>
               </p:ext>
             </p:extLst>
           </p:nvPr>
@@ -13209,7 +13282,7 @@
           <p:cNvPr id="2" name="Título 1">
             <a:extLst>
               <a:ext uri="{FF2B5EF4-FFF2-40B4-BE49-F238E27FC236}">
-                <a16:creationId xmlns:a16="http://schemas.microsoft.com/office/drawing/2014/main" id="{41FBFCCA-1242-466A-A522-CAB0B5421C1A}"/>
+                <a16:creationId xmlns:a16="http://schemas.microsoft.com/office/drawing/2014/main" id="{053C1FFA-43A4-4CD4-9566-487E5A08471B}"/>
               </a:ext>
             </a:extLst>
           </p:cNvPr>
@@ -13217,7 +13290,7 @@
             <a:spLocks noGrp="1"/>
           </p:cNvSpPr>
           <p:nvPr>
-            <p:ph type="title"/>
+            <p:ph type="ctrTitle"/>
           </p:nvPr>
         </p:nvSpPr>
         <p:spPr/>
@@ -13227,17 +13300,17 @@
           <a:p>
             <a:r>
               <a:rPr lang="es-MX" dirty="0"/>
-              <a:t>Agregar archivos en el repositorio</a:t>
+              <a:t>Iniciando Código</a:t>
             </a:r>
           </a:p>
         </p:txBody>
       </p:sp>
       <p:sp>
         <p:nvSpPr>
-          <p:cNvPr id="3" name="Marcador de contenido 2">
+          <p:cNvPr id="3" name="Subtítulo 2">
             <a:extLst>
               <a:ext uri="{FF2B5EF4-FFF2-40B4-BE49-F238E27FC236}">
-                <a16:creationId xmlns:a16="http://schemas.microsoft.com/office/drawing/2014/main" id="{F4B1A559-620E-405D-8BE5-3418693A5307}"/>
+                <a16:creationId xmlns:a16="http://schemas.microsoft.com/office/drawing/2014/main" id="{D9E656B3-7324-423D-A034-4D9E3E038709}"/>
               </a:ext>
             </a:extLst>
           </p:cNvPr>
@@ -13245,7 +13318,7 @@
             <a:spLocks noGrp="1"/>
           </p:cNvSpPr>
           <p:nvPr>
-            <p:ph idx="1"/>
+            <p:ph type="subTitle" idx="1"/>
           </p:nvPr>
         </p:nvSpPr>
         <p:spPr/>
@@ -13253,116 +13326,14 @@
           <a:bodyPr/>
           <a:lstStyle/>
           <a:p>
-            <a:pPr marL="457200" indent="-457200">
-              <a:buFont typeface="+mj-lt"/>
-              <a:buAutoNum type="arabicPeriod"/>
-            </a:pPr>
-            <a:r>
-              <a:rPr lang="es-MX" dirty="0"/>
-              <a:t>echo “Hola mundo" &gt;&gt; holaMundo.txt </a:t>
-            </a:r>
-          </a:p>
-          <a:p>
-            <a:pPr marL="749808" lvl="1" indent="-457200">
-              <a:buFont typeface="+mj-lt"/>
-              <a:buAutoNum type="arabicPeriod"/>
-            </a:pPr>
-            <a:r>
-              <a:rPr lang="es-MX" dirty="0"/>
-              <a:t>crear un archivo en la carpeta del repositorio</a:t>
-            </a:r>
-          </a:p>
-          <a:p>
-            <a:pPr marL="457200" indent="-457200">
-              <a:buFont typeface="+mj-lt"/>
-              <a:buAutoNum type="arabicPeriod"/>
-            </a:pPr>
-            <a:r>
-              <a:rPr lang="es-MX" dirty="0"/>
-              <a:t>git status </a:t>
-            </a:r>
-            <a:r>
-              <a:rPr lang="es-MX" dirty="0">
-                <a:solidFill>
-                  <a:srgbClr val="0070C0"/>
-                </a:solidFill>
-              </a:rPr>
-              <a:t>*Solo para visualizar los documentos que cambiaron es opcional</a:t>
-            </a:r>
-          </a:p>
-          <a:p>
-            <a:pPr marL="457200" indent="-457200">
-              <a:buFont typeface="+mj-lt"/>
-              <a:buAutoNum type="arabicPeriod"/>
-            </a:pPr>
-            <a:r>
-              <a:rPr lang="es-MX" dirty="0"/>
-              <a:t>git add .	</a:t>
-            </a:r>
-          </a:p>
-          <a:p>
-            <a:pPr marL="749808" lvl="1" indent="-457200">
-              <a:buFont typeface="+mj-lt"/>
-              <a:buAutoNum type="arabicPeriod"/>
-            </a:pPr>
-            <a:r>
-              <a:rPr lang="es-MX" dirty="0"/>
-              <a:t>git add </a:t>
-            </a:r>
-            <a:r>
-              <a:rPr lang="es-MX" b="1" dirty="0">
-                <a:solidFill>
-                  <a:srgbClr val="FF0000"/>
-                </a:solidFill>
-              </a:rPr>
-              <a:t>:</a:t>
-            </a:r>
-            <a:r>
-              <a:rPr lang="es-MX" b="1" dirty="0" err="1">
-                <a:solidFill>
-                  <a:srgbClr val="FF0000"/>
-                </a:solidFill>
-              </a:rPr>
-              <a:t>fullPathArchivo</a:t>
-            </a:r>
-            <a:endParaRPr lang="es-MX" b="1" dirty="0">
-              <a:solidFill>
-                <a:srgbClr val="FF0000"/>
-              </a:solidFill>
-            </a:endParaRPr>
-          </a:p>
-          <a:p>
-            <a:pPr marL="457200" indent="-457200">
-              <a:buFont typeface="+mj-lt"/>
-              <a:buAutoNum type="arabicPeriod"/>
-            </a:pPr>
-            <a:r>
-              <a:rPr lang="es-MX" dirty="0"/>
-              <a:t>git commit –m “Comentario del commit”</a:t>
-            </a:r>
-          </a:p>
-          <a:p>
-            <a:pPr marL="457200" indent="-457200">
-              <a:buFont typeface="+mj-lt"/>
-              <a:buAutoNum type="arabicPeriod"/>
-            </a:pPr>
-            <a:r>
-              <a:rPr lang="es-MX" dirty="0"/>
-              <a:t>git push</a:t>
-            </a:r>
-          </a:p>
-          <a:p>
-            <a:pPr marL="0" indent="0">
-              <a:buNone/>
-            </a:pPr>
-            <a:endParaRPr lang="es-MX" dirty="0"/>
+            <a:endParaRPr lang="es-MX"/>
           </a:p>
         </p:txBody>
       </p:sp>
     </p:spTree>
     <p:extLst>
       <p:ext uri="{BB962C8B-B14F-4D97-AF65-F5344CB8AC3E}">
-        <p14:creationId xmlns:p14="http://schemas.microsoft.com/office/powerpoint/2010/main" val="4245653520"/>
+        <p14:creationId xmlns:p14="http://schemas.microsoft.com/office/powerpoint/2010/main" val="3529288774"/>
       </p:ext>
     </p:extLst>
   </p:cSld>
@@ -13513,7 +13484,7 @@
           <p:cNvPr id="2" name="Título 1">
             <a:extLst>
               <a:ext uri="{FF2B5EF4-FFF2-40B4-BE49-F238E27FC236}">
-                <a16:creationId xmlns:a16="http://schemas.microsoft.com/office/drawing/2014/main" id="{6FB28050-4A6A-4911-B3C3-BCB8B86F7AED}"/>
+                <a16:creationId xmlns:a16="http://schemas.microsoft.com/office/drawing/2014/main" id="{83D45168-4BCF-422D-89BF-AA87A4EE4478}"/>
               </a:ext>
             </a:extLst>
           </p:cNvPr>
@@ -13531,7 +13502,7 @@
           <a:p>
             <a:r>
               <a:rPr lang="es-MX" dirty="0"/>
-              <a:t>Recibir los cambios</a:t>
+              <a:t>Caso 1</a:t>
             </a:r>
           </a:p>
         </p:txBody>
@@ -13541,7 +13512,7 @@
           <p:cNvPr id="3" name="Marcador de contenido 2">
             <a:extLst>
               <a:ext uri="{FF2B5EF4-FFF2-40B4-BE49-F238E27FC236}">
-                <a16:creationId xmlns:a16="http://schemas.microsoft.com/office/drawing/2014/main" id="{5D11A53A-442D-432D-857E-81D84ADAD925}"/>
+                <a16:creationId xmlns:a16="http://schemas.microsoft.com/office/drawing/2014/main" id="{C27EF8D7-056F-4878-9713-8EE6E09740FA}"/>
               </a:ext>
             </a:extLst>
           </p:cNvPr>
@@ -13557,161 +13528,14 @@
           <a:bodyPr/>
           <a:lstStyle/>
           <a:p>
-            <a:pPr marL="457200" indent="-457200">
-              <a:buFont typeface="+mj-lt"/>
-              <a:buAutoNum type="arabicPeriod"/>
-            </a:pPr>
-            <a:r>
-              <a:rPr lang="es-MX" dirty="0"/>
-              <a:t>git push</a:t>
-            </a:r>
-          </a:p>
-          <a:p>
-            <a:pPr marL="749808" lvl="1" indent="-457200">
-              <a:buFont typeface="+mj-lt"/>
-              <a:buAutoNum type="arabicPeriod"/>
-            </a:pPr>
-            <a:r>
-              <a:rPr lang="es-MX" dirty="0"/>
-              <a:t>Si existen conflictos se necesita decidir por los archivos.</a:t>
-            </a:r>
-          </a:p>
-          <a:p>
-            <a:pPr marL="749808" lvl="1" indent="-457200">
-              <a:buFont typeface="+mj-lt"/>
-              <a:buAutoNum type="arabicPeriod"/>
-            </a:pPr>
-            <a:r>
-              <a:rPr lang="es-MX" dirty="0"/>
-              <a:t>Se puede ocupar una herramienta como un </a:t>
-            </a:r>
-            <a:r>
-              <a:rPr lang="es-MX" i="1" dirty="0"/>
-              <a:t>git </a:t>
-            </a:r>
-            <a:r>
-              <a:rPr lang="es-MX" i="1" dirty="0" err="1"/>
-              <a:t>diff</a:t>
-            </a:r>
-            <a:r>
-              <a:rPr lang="es-MX" i="1" dirty="0"/>
-              <a:t> </a:t>
-            </a:r>
-            <a:r>
-              <a:rPr lang="es-MX" b="1" i="1" dirty="0">
-                <a:solidFill>
-                  <a:srgbClr val="FF0000"/>
-                </a:solidFill>
-              </a:rPr>
-              <a:t>:</a:t>
-            </a:r>
-            <a:r>
-              <a:rPr lang="es-MX" b="1" i="1" dirty="0" err="1">
-                <a:solidFill>
-                  <a:srgbClr val="FF0000"/>
-                </a:solidFill>
-              </a:rPr>
-              <a:t>fileName</a:t>
-            </a:r>
-            <a:endParaRPr lang="es-MX" b="1" i="1" dirty="0">
-              <a:solidFill>
-                <a:srgbClr val="FF0000"/>
-              </a:solidFill>
-            </a:endParaRPr>
-          </a:p>
-          <a:p>
-            <a:pPr marL="457200" indent="-457200">
-              <a:buFont typeface="+mj-lt"/>
-              <a:buAutoNum type="arabicPeriod"/>
-            </a:pPr>
-            <a:r>
-              <a:rPr lang="es-MX" dirty="0"/>
-              <a:t>Se puede hacer un </a:t>
-            </a:r>
-            <a:r>
-              <a:rPr lang="es-MX" b="1" dirty="0">
-                <a:solidFill>
-                  <a:srgbClr val="FF0000"/>
-                </a:solidFill>
-              </a:rPr>
-              <a:t>MERGE</a:t>
-            </a:r>
-            <a:r>
-              <a:rPr lang="es-MX" dirty="0"/>
-              <a:t> o un </a:t>
-            </a:r>
-            <a:r>
-              <a:rPr lang="es-MX" b="1" dirty="0">
-                <a:solidFill>
-                  <a:srgbClr val="FF0000"/>
-                </a:solidFill>
-              </a:rPr>
-              <a:t>FAST FORWARD</a:t>
-            </a:r>
-            <a:r>
-              <a:rPr lang="es-MX" dirty="0"/>
-              <a:t>.</a:t>
-            </a:r>
-          </a:p>
-          <a:p>
-            <a:pPr marL="457200" indent="-457200">
-              <a:buFont typeface="+mj-lt"/>
-              <a:buAutoNum type="arabicPeriod"/>
-            </a:pPr>
-            <a:r>
-              <a:rPr lang="es-MX" dirty="0"/>
-              <a:t>Evita hacer a toda costa las acciones </a:t>
-            </a:r>
-            <a:r>
-              <a:rPr lang="es-MX" b="1" dirty="0">
-                <a:solidFill>
-                  <a:srgbClr val="FF0000"/>
-                </a:solidFill>
-              </a:rPr>
-              <a:t>REBASE </a:t>
-            </a:r>
-            <a:r>
-              <a:rPr lang="es-MX" dirty="0">
-                <a:solidFill>
-                  <a:srgbClr val="404040"/>
-                </a:solidFill>
-              </a:rPr>
-              <a:t>Suelen ser </a:t>
-            </a:r>
-            <a:r>
-              <a:rPr lang="es-MX" dirty="0">
-                <a:solidFill>
-                  <a:srgbClr val="FF0000"/>
-                </a:solidFill>
-              </a:rPr>
-              <a:t>acciones destructivas </a:t>
-            </a:r>
-            <a:r>
-              <a:rPr lang="es-MX" dirty="0">
-                <a:solidFill>
-                  <a:srgbClr val="404040"/>
-                </a:solidFill>
-              </a:rPr>
-              <a:t>que terminan por borrar tus archivos del repositorio.</a:t>
-            </a:r>
-          </a:p>
-          <a:p>
-            <a:pPr marL="457200" indent="-457200">
-              <a:buFont typeface="+mj-lt"/>
-              <a:buAutoNum type="arabicPeriod"/>
-            </a:pPr>
-            <a:endParaRPr lang="es-MX" b="1" dirty="0">
-              <a:solidFill>
-                <a:srgbClr val="404040"/>
-              </a:solidFill>
-            </a:endParaRPr>
+            <a:endParaRPr lang="es-MX"/>
           </a:p>
         </p:txBody>
       </p:sp>
     </p:spTree>
     <p:extLst>
       <p:ext uri="{BB962C8B-B14F-4D97-AF65-F5344CB8AC3E}">
-        <p14:creationId xmlns:p14="http://schemas.microsoft.com/office/powerpoint/2010/main" val="3195377996"/>
+        <p14:creationId xmlns:p14="http://schemas.microsoft.com/office/powerpoint/2010/main" val="386018502"/>
       </p:ext>
     </p:extLst>
   </p:cSld>
@@ -13722,6 +13546,629 @@
 </file>
 
 <file path=ppt/slides/slide21.xml><?xml version="1.0" encoding="utf-8"?>
+<p:sld xmlns:a="http://schemas.openxmlformats.org/drawingml/2006/main" xmlns:r="http://schemas.openxmlformats.org/officeDocument/2006/relationships" xmlns:p="http://schemas.openxmlformats.org/presentationml/2006/main">
+  <p:cSld>
+    <p:spTree>
+      <p:nvGrpSpPr>
+        <p:cNvPr id="1" name=""/>
+        <p:cNvGrpSpPr/>
+        <p:nvPr/>
+      </p:nvGrpSpPr>
+      <p:grpSpPr>
+        <a:xfrm>
+          <a:off x="0" y="0"/>
+          <a:ext cx="0" cy="0"/>
+          <a:chOff x="0" y="0"/>
+          <a:chExt cx="0" cy="0"/>
+        </a:xfrm>
+      </p:grpSpPr>
+      <p:sp>
+        <p:nvSpPr>
+          <p:cNvPr id="2" name="Título 1">
+            <a:extLst>
+              <a:ext uri="{FF2B5EF4-FFF2-40B4-BE49-F238E27FC236}">
+                <a16:creationId xmlns:a16="http://schemas.microsoft.com/office/drawing/2014/main" id="{0A58494E-2A76-48C8-A1BC-2139B69B6B4F}"/>
+              </a:ext>
+            </a:extLst>
+          </p:cNvPr>
+          <p:cNvSpPr>
+            <a:spLocks noGrp="1"/>
+          </p:cNvSpPr>
+          <p:nvPr>
+            <p:ph type="title"/>
+          </p:nvPr>
+        </p:nvSpPr>
+        <p:spPr/>
+        <p:txBody>
+          <a:bodyPr/>
+          <a:lstStyle/>
+          <a:p>
+            <a:r>
+              <a:rPr lang="es-MX" dirty="0"/>
+              <a:t>Caso 1</a:t>
+            </a:r>
+          </a:p>
+        </p:txBody>
+      </p:sp>
+      <p:sp>
+        <p:nvSpPr>
+          <p:cNvPr id="3" name="Marcador de texto 2">
+            <a:extLst>
+              <a:ext uri="{FF2B5EF4-FFF2-40B4-BE49-F238E27FC236}">
+                <a16:creationId xmlns:a16="http://schemas.microsoft.com/office/drawing/2014/main" id="{D5B51704-E8EE-45BF-A251-374B8CAEED41}"/>
+              </a:ext>
+            </a:extLst>
+          </p:cNvPr>
+          <p:cNvSpPr>
+            <a:spLocks noGrp="1"/>
+          </p:cNvSpPr>
+          <p:nvPr>
+            <p:ph type="body" idx="1"/>
+          </p:nvPr>
+        </p:nvSpPr>
+        <p:spPr/>
+        <p:txBody>
+          <a:bodyPr/>
+          <a:lstStyle/>
+          <a:p>
+            <a:r>
+              <a:rPr lang="es-MX" dirty="0" err="1"/>
+              <a:t>Respositorio</a:t>
+            </a:r>
+            <a:r>
+              <a:rPr lang="es-MX" dirty="0"/>
+              <a:t> Nuevo con codigo existente</a:t>
+            </a:r>
+          </a:p>
+        </p:txBody>
+      </p:sp>
+    </p:spTree>
+    <p:extLst>
+      <p:ext uri="{BB962C8B-B14F-4D97-AF65-F5344CB8AC3E}">
+        <p14:creationId xmlns:p14="http://schemas.microsoft.com/office/powerpoint/2010/main" val="2523404977"/>
+      </p:ext>
+    </p:extLst>
+  </p:cSld>
+  <p:clrMapOvr>
+    <a:masterClrMapping/>
+  </p:clrMapOvr>
+</p:sld>
+</file>
+
+<file path=ppt/slides/slide22.xml><?xml version="1.0" encoding="utf-8"?>
+<p:sld xmlns:a="http://schemas.openxmlformats.org/drawingml/2006/main" xmlns:r="http://schemas.openxmlformats.org/officeDocument/2006/relationships" xmlns:p="http://schemas.openxmlformats.org/presentationml/2006/main">
+  <p:cSld>
+    <p:spTree>
+      <p:nvGrpSpPr>
+        <p:cNvPr id="1" name=""/>
+        <p:cNvGrpSpPr/>
+        <p:nvPr/>
+      </p:nvGrpSpPr>
+      <p:grpSpPr>
+        <a:xfrm>
+          <a:off x="0" y="0"/>
+          <a:ext cx="0" cy="0"/>
+          <a:chOff x="0" y="0"/>
+          <a:chExt cx="0" cy="0"/>
+        </a:xfrm>
+      </p:grpSpPr>
+      <p:sp>
+        <p:nvSpPr>
+          <p:cNvPr id="2" name="Título 1">
+            <a:extLst>
+              <a:ext uri="{FF2B5EF4-FFF2-40B4-BE49-F238E27FC236}">
+                <a16:creationId xmlns:a16="http://schemas.microsoft.com/office/drawing/2014/main" id="{41FBFCCA-1242-466A-A522-CAB0B5421C1A}"/>
+              </a:ext>
+            </a:extLst>
+          </p:cNvPr>
+          <p:cNvSpPr>
+            <a:spLocks noGrp="1"/>
+          </p:cNvSpPr>
+          <p:nvPr>
+            <p:ph type="title"/>
+          </p:nvPr>
+        </p:nvSpPr>
+        <p:spPr/>
+        <p:txBody>
+          <a:bodyPr/>
+          <a:lstStyle/>
+          <a:p>
+            <a:r>
+              <a:rPr lang="es-MX" dirty="0"/>
+              <a:t>Agregar archivos en el repositorio</a:t>
+            </a:r>
+          </a:p>
+        </p:txBody>
+      </p:sp>
+      <p:sp>
+        <p:nvSpPr>
+          <p:cNvPr id="3" name="Marcador de contenido 2">
+            <a:extLst>
+              <a:ext uri="{FF2B5EF4-FFF2-40B4-BE49-F238E27FC236}">
+                <a16:creationId xmlns:a16="http://schemas.microsoft.com/office/drawing/2014/main" id="{F4B1A559-620E-405D-8BE5-3418693A5307}"/>
+              </a:ext>
+            </a:extLst>
+          </p:cNvPr>
+          <p:cNvSpPr>
+            <a:spLocks noGrp="1"/>
+          </p:cNvSpPr>
+          <p:nvPr>
+            <p:ph idx="1"/>
+          </p:nvPr>
+        </p:nvSpPr>
+        <p:spPr/>
+        <p:txBody>
+          <a:bodyPr/>
+          <a:lstStyle/>
+          <a:p>
+            <a:pPr marL="457200" indent="-457200">
+              <a:buFont typeface="+mj-lt"/>
+              <a:buAutoNum type="arabicPeriod"/>
+            </a:pPr>
+            <a:r>
+              <a:rPr lang="es-MX" dirty="0"/>
+              <a:t>echo “Hola mundo" &gt;&gt; holaMundo.txt </a:t>
+            </a:r>
+          </a:p>
+          <a:p>
+            <a:pPr marL="749808" lvl="1" indent="-457200">
+              <a:buFont typeface="+mj-lt"/>
+              <a:buAutoNum type="arabicPeriod"/>
+            </a:pPr>
+            <a:r>
+              <a:rPr lang="es-MX" dirty="0"/>
+              <a:t>crear un archivo en la carpeta del repositorio</a:t>
+            </a:r>
+          </a:p>
+          <a:p>
+            <a:pPr marL="457200" indent="-457200">
+              <a:buFont typeface="+mj-lt"/>
+              <a:buAutoNum type="arabicPeriod"/>
+            </a:pPr>
+            <a:r>
+              <a:rPr lang="es-MX" dirty="0"/>
+              <a:t>git status </a:t>
+            </a:r>
+            <a:r>
+              <a:rPr lang="es-MX" dirty="0">
+                <a:solidFill>
+                  <a:srgbClr val="0070C0"/>
+                </a:solidFill>
+              </a:rPr>
+              <a:t>*Solo para visualizar los documentos que cambiaron es opcional</a:t>
+            </a:r>
+          </a:p>
+          <a:p>
+            <a:pPr marL="457200" indent="-457200">
+              <a:buFont typeface="+mj-lt"/>
+              <a:buAutoNum type="arabicPeriod"/>
+            </a:pPr>
+            <a:r>
+              <a:rPr lang="es-MX" dirty="0"/>
+              <a:t>git add .	</a:t>
+            </a:r>
+          </a:p>
+          <a:p>
+            <a:pPr marL="749808" lvl="1" indent="-457200">
+              <a:buFont typeface="+mj-lt"/>
+              <a:buAutoNum type="arabicPeriod"/>
+            </a:pPr>
+            <a:r>
+              <a:rPr lang="es-MX" dirty="0"/>
+              <a:t>git add </a:t>
+            </a:r>
+            <a:r>
+              <a:rPr lang="es-MX" b="1" dirty="0">
+                <a:solidFill>
+                  <a:srgbClr val="FF0000"/>
+                </a:solidFill>
+              </a:rPr>
+              <a:t>:</a:t>
+            </a:r>
+            <a:r>
+              <a:rPr lang="es-MX" b="1" dirty="0" err="1">
+                <a:solidFill>
+                  <a:srgbClr val="FF0000"/>
+                </a:solidFill>
+              </a:rPr>
+              <a:t>fullPathArchivo</a:t>
+            </a:r>
+            <a:endParaRPr lang="es-MX" b="1" dirty="0">
+              <a:solidFill>
+                <a:srgbClr val="FF0000"/>
+              </a:solidFill>
+            </a:endParaRPr>
+          </a:p>
+          <a:p>
+            <a:pPr marL="457200" indent="-457200">
+              <a:buFont typeface="+mj-lt"/>
+              <a:buAutoNum type="arabicPeriod"/>
+            </a:pPr>
+            <a:r>
+              <a:rPr lang="es-MX" dirty="0"/>
+              <a:t>git commit –m “Comentario del commit”</a:t>
+            </a:r>
+          </a:p>
+          <a:p>
+            <a:pPr marL="457200" indent="-457200">
+              <a:buFont typeface="+mj-lt"/>
+              <a:buAutoNum type="arabicPeriod"/>
+            </a:pPr>
+            <a:r>
+              <a:rPr lang="es-MX" dirty="0"/>
+              <a:t>git push</a:t>
+            </a:r>
+          </a:p>
+          <a:p>
+            <a:pPr marL="0" indent="0">
+              <a:buNone/>
+            </a:pPr>
+            <a:endParaRPr lang="es-MX" dirty="0"/>
+          </a:p>
+        </p:txBody>
+      </p:sp>
+    </p:spTree>
+    <p:extLst>
+      <p:ext uri="{BB962C8B-B14F-4D97-AF65-F5344CB8AC3E}">
+        <p14:creationId xmlns:p14="http://schemas.microsoft.com/office/powerpoint/2010/main" val="4245653520"/>
+      </p:ext>
+    </p:extLst>
+  </p:cSld>
+  <p:clrMapOvr>
+    <a:masterClrMapping/>
+  </p:clrMapOvr>
+</p:sld>
+</file>
+
+<file path=ppt/slides/slide23.xml><?xml version="1.0" encoding="utf-8"?>
+<p:sld xmlns:a="http://schemas.openxmlformats.org/drawingml/2006/main" xmlns:r="http://schemas.openxmlformats.org/officeDocument/2006/relationships" xmlns:p="http://schemas.openxmlformats.org/presentationml/2006/main">
+  <p:cSld>
+    <p:spTree>
+      <p:nvGrpSpPr>
+        <p:cNvPr id="1" name=""/>
+        <p:cNvGrpSpPr/>
+        <p:nvPr/>
+      </p:nvGrpSpPr>
+      <p:grpSpPr>
+        <a:xfrm>
+          <a:off x="0" y="0"/>
+          <a:ext cx="0" cy="0"/>
+          <a:chOff x="0" y="0"/>
+          <a:chExt cx="0" cy="0"/>
+        </a:xfrm>
+      </p:grpSpPr>
+      <p:sp>
+        <p:nvSpPr>
+          <p:cNvPr id="2" name="Título 1">
+            <a:extLst>
+              <a:ext uri="{FF2B5EF4-FFF2-40B4-BE49-F238E27FC236}">
+                <a16:creationId xmlns:a16="http://schemas.microsoft.com/office/drawing/2014/main" id="{0A58494E-2A76-48C8-A1BC-2139B69B6B4F}"/>
+              </a:ext>
+            </a:extLst>
+          </p:cNvPr>
+          <p:cNvSpPr>
+            <a:spLocks noGrp="1"/>
+          </p:cNvSpPr>
+          <p:nvPr>
+            <p:ph type="title"/>
+          </p:nvPr>
+        </p:nvSpPr>
+        <p:spPr/>
+        <p:txBody>
+          <a:bodyPr/>
+          <a:lstStyle/>
+          <a:p>
+            <a:r>
+              <a:rPr lang="es-MX" dirty="0"/>
+              <a:t>Caso 2</a:t>
+            </a:r>
+          </a:p>
+        </p:txBody>
+      </p:sp>
+      <p:sp>
+        <p:nvSpPr>
+          <p:cNvPr id="3" name="Marcador de texto 2">
+            <a:extLst>
+              <a:ext uri="{FF2B5EF4-FFF2-40B4-BE49-F238E27FC236}">
+                <a16:creationId xmlns:a16="http://schemas.microsoft.com/office/drawing/2014/main" id="{D5B51704-E8EE-45BF-A251-374B8CAEED41}"/>
+              </a:ext>
+            </a:extLst>
+          </p:cNvPr>
+          <p:cNvSpPr>
+            <a:spLocks noGrp="1"/>
+          </p:cNvSpPr>
+          <p:nvPr>
+            <p:ph type="body" idx="1"/>
+          </p:nvPr>
+        </p:nvSpPr>
+        <p:spPr/>
+        <p:txBody>
+          <a:bodyPr/>
+          <a:lstStyle/>
+          <a:p>
+            <a:r>
+              <a:rPr lang="es-MX" dirty="0" err="1"/>
+              <a:t>Merges</a:t>
+            </a:r>
+            <a:r>
+              <a:rPr lang="es-MX" dirty="0"/>
+              <a:t> Locales</a:t>
+            </a:r>
+          </a:p>
+        </p:txBody>
+      </p:sp>
+    </p:spTree>
+    <p:extLst>
+      <p:ext uri="{BB962C8B-B14F-4D97-AF65-F5344CB8AC3E}">
+        <p14:creationId xmlns:p14="http://schemas.microsoft.com/office/powerpoint/2010/main" val="723863442"/>
+      </p:ext>
+    </p:extLst>
+  </p:cSld>
+  <p:clrMapOvr>
+    <a:masterClrMapping/>
+  </p:clrMapOvr>
+</p:sld>
+</file>
+
+<file path=ppt/slides/slide24.xml><?xml version="1.0" encoding="utf-8"?>
+<p:sld xmlns:a="http://schemas.openxmlformats.org/drawingml/2006/main" xmlns:r="http://schemas.openxmlformats.org/officeDocument/2006/relationships" xmlns:p="http://schemas.openxmlformats.org/presentationml/2006/main">
+  <p:cSld>
+    <p:spTree>
+      <p:nvGrpSpPr>
+        <p:cNvPr id="1" name=""/>
+        <p:cNvGrpSpPr/>
+        <p:nvPr/>
+      </p:nvGrpSpPr>
+      <p:grpSpPr>
+        <a:xfrm>
+          <a:off x="0" y="0"/>
+          <a:ext cx="0" cy="0"/>
+          <a:chOff x="0" y="0"/>
+          <a:chExt cx="0" cy="0"/>
+        </a:xfrm>
+      </p:grpSpPr>
+      <p:sp>
+        <p:nvSpPr>
+          <p:cNvPr id="2" name="Título 1">
+            <a:extLst>
+              <a:ext uri="{FF2B5EF4-FFF2-40B4-BE49-F238E27FC236}">
+                <a16:creationId xmlns:a16="http://schemas.microsoft.com/office/drawing/2014/main" id="{0A58494E-2A76-48C8-A1BC-2139B69B6B4F}"/>
+              </a:ext>
+            </a:extLst>
+          </p:cNvPr>
+          <p:cNvSpPr>
+            <a:spLocks noGrp="1"/>
+          </p:cNvSpPr>
+          <p:nvPr>
+            <p:ph type="title"/>
+          </p:nvPr>
+        </p:nvSpPr>
+        <p:spPr/>
+        <p:txBody>
+          <a:bodyPr/>
+          <a:lstStyle/>
+          <a:p>
+            <a:r>
+              <a:rPr lang="es-MX" dirty="0"/>
+              <a:t>Caso 3</a:t>
+            </a:r>
+          </a:p>
+        </p:txBody>
+      </p:sp>
+      <p:sp>
+        <p:nvSpPr>
+          <p:cNvPr id="3" name="Marcador de texto 2">
+            <a:extLst>
+              <a:ext uri="{FF2B5EF4-FFF2-40B4-BE49-F238E27FC236}">
+                <a16:creationId xmlns:a16="http://schemas.microsoft.com/office/drawing/2014/main" id="{D5B51704-E8EE-45BF-A251-374B8CAEED41}"/>
+              </a:ext>
+            </a:extLst>
+          </p:cNvPr>
+          <p:cNvSpPr>
+            <a:spLocks noGrp="1"/>
+          </p:cNvSpPr>
+          <p:nvPr>
+            <p:ph type="body" idx="1"/>
+          </p:nvPr>
+        </p:nvSpPr>
+        <p:spPr/>
+        <p:txBody>
+          <a:bodyPr/>
+          <a:lstStyle/>
+          <a:p>
+            <a:r>
+              <a:rPr lang="es-MX" dirty="0"/>
+              <a:t>Creación y Cambios de rama</a:t>
+            </a:r>
+          </a:p>
+        </p:txBody>
+      </p:sp>
+    </p:spTree>
+    <p:extLst>
+      <p:ext uri="{BB962C8B-B14F-4D97-AF65-F5344CB8AC3E}">
+        <p14:creationId xmlns:p14="http://schemas.microsoft.com/office/powerpoint/2010/main" val="1212224362"/>
+      </p:ext>
+    </p:extLst>
+  </p:cSld>
+  <p:clrMapOvr>
+    <a:masterClrMapping/>
+  </p:clrMapOvr>
+</p:sld>
+</file>
+
+<file path=ppt/slides/slide25.xml><?xml version="1.0" encoding="utf-8"?>
+<p:sld xmlns:a="http://schemas.openxmlformats.org/drawingml/2006/main" xmlns:r="http://schemas.openxmlformats.org/officeDocument/2006/relationships" xmlns:p="http://schemas.openxmlformats.org/presentationml/2006/main">
+  <p:cSld>
+    <p:spTree>
+      <p:nvGrpSpPr>
+        <p:cNvPr id="1" name=""/>
+        <p:cNvGrpSpPr/>
+        <p:nvPr/>
+      </p:nvGrpSpPr>
+      <p:grpSpPr>
+        <a:xfrm>
+          <a:off x="0" y="0"/>
+          <a:ext cx="0" cy="0"/>
+          <a:chOff x="0" y="0"/>
+          <a:chExt cx="0" cy="0"/>
+        </a:xfrm>
+      </p:grpSpPr>
+      <p:sp>
+        <p:nvSpPr>
+          <p:cNvPr id="2" name="Título 1">
+            <a:extLst>
+              <a:ext uri="{FF2B5EF4-FFF2-40B4-BE49-F238E27FC236}">
+                <a16:creationId xmlns:a16="http://schemas.microsoft.com/office/drawing/2014/main" id="{0A58494E-2A76-48C8-A1BC-2139B69B6B4F}"/>
+              </a:ext>
+            </a:extLst>
+          </p:cNvPr>
+          <p:cNvSpPr>
+            <a:spLocks noGrp="1"/>
+          </p:cNvSpPr>
+          <p:nvPr>
+            <p:ph type="title"/>
+          </p:nvPr>
+        </p:nvSpPr>
+        <p:spPr/>
+        <p:txBody>
+          <a:bodyPr/>
+          <a:lstStyle/>
+          <a:p>
+            <a:r>
+              <a:rPr lang="es-MX" dirty="0"/>
+              <a:t>Caso 4</a:t>
+            </a:r>
+          </a:p>
+        </p:txBody>
+      </p:sp>
+      <p:sp>
+        <p:nvSpPr>
+          <p:cNvPr id="3" name="Marcador de texto 2">
+            <a:extLst>
+              <a:ext uri="{FF2B5EF4-FFF2-40B4-BE49-F238E27FC236}">
+                <a16:creationId xmlns:a16="http://schemas.microsoft.com/office/drawing/2014/main" id="{D5B51704-E8EE-45BF-A251-374B8CAEED41}"/>
+              </a:ext>
+            </a:extLst>
+          </p:cNvPr>
+          <p:cNvSpPr>
+            <a:spLocks noGrp="1"/>
+          </p:cNvSpPr>
+          <p:nvPr>
+            <p:ph type="body" idx="1"/>
+          </p:nvPr>
+        </p:nvSpPr>
+        <p:spPr/>
+        <p:txBody>
+          <a:bodyPr/>
+          <a:lstStyle/>
+          <a:p>
+            <a:r>
+              <a:rPr lang="es-MX" dirty="0"/>
+              <a:t>Forzar commits (Ignorando cambios)</a:t>
+            </a:r>
+          </a:p>
+        </p:txBody>
+      </p:sp>
+    </p:spTree>
+    <p:extLst>
+      <p:ext uri="{BB962C8B-B14F-4D97-AF65-F5344CB8AC3E}">
+        <p14:creationId xmlns:p14="http://schemas.microsoft.com/office/powerpoint/2010/main" val="3565596830"/>
+      </p:ext>
+    </p:extLst>
+  </p:cSld>
+  <p:clrMapOvr>
+    <a:masterClrMapping/>
+  </p:clrMapOvr>
+</p:sld>
+</file>
+
+<file path=ppt/slides/slide26.xml><?xml version="1.0" encoding="utf-8"?>
+<p:sld xmlns:a="http://schemas.openxmlformats.org/drawingml/2006/main" xmlns:r="http://schemas.openxmlformats.org/officeDocument/2006/relationships" xmlns:p="http://schemas.openxmlformats.org/presentationml/2006/main">
+  <p:cSld>
+    <p:spTree>
+      <p:nvGrpSpPr>
+        <p:cNvPr id="1" name=""/>
+        <p:cNvGrpSpPr/>
+        <p:nvPr/>
+      </p:nvGrpSpPr>
+      <p:grpSpPr>
+        <a:xfrm>
+          <a:off x="0" y="0"/>
+          <a:ext cx="0" cy="0"/>
+          <a:chOff x="0" y="0"/>
+          <a:chExt cx="0" cy="0"/>
+        </a:xfrm>
+      </p:grpSpPr>
+      <p:sp>
+        <p:nvSpPr>
+          <p:cNvPr id="2" name="Título 1">
+            <a:extLst>
+              <a:ext uri="{FF2B5EF4-FFF2-40B4-BE49-F238E27FC236}">
+                <a16:creationId xmlns:a16="http://schemas.microsoft.com/office/drawing/2014/main" id="{0A58494E-2A76-48C8-A1BC-2139B69B6B4F}"/>
+              </a:ext>
+            </a:extLst>
+          </p:cNvPr>
+          <p:cNvSpPr>
+            <a:spLocks noGrp="1"/>
+          </p:cNvSpPr>
+          <p:nvPr>
+            <p:ph type="title"/>
+          </p:nvPr>
+        </p:nvSpPr>
+        <p:spPr/>
+        <p:txBody>
+          <a:bodyPr/>
+          <a:lstStyle/>
+          <a:p>
+            <a:r>
+              <a:rPr lang="es-MX" dirty="0"/>
+              <a:t>Caso 5</a:t>
+            </a:r>
+          </a:p>
+        </p:txBody>
+      </p:sp>
+      <p:sp>
+        <p:nvSpPr>
+          <p:cNvPr id="3" name="Marcador de texto 2">
+            <a:extLst>
+              <a:ext uri="{FF2B5EF4-FFF2-40B4-BE49-F238E27FC236}">
+                <a16:creationId xmlns:a16="http://schemas.microsoft.com/office/drawing/2014/main" id="{D5B51704-E8EE-45BF-A251-374B8CAEED41}"/>
+              </a:ext>
+            </a:extLst>
+          </p:cNvPr>
+          <p:cNvSpPr>
+            <a:spLocks noGrp="1"/>
+          </p:cNvSpPr>
+          <p:nvPr>
+            <p:ph type="body" idx="1"/>
+          </p:nvPr>
+        </p:nvSpPr>
+        <p:spPr/>
+        <p:txBody>
+          <a:bodyPr/>
+          <a:lstStyle/>
+          <a:p>
+            <a:r>
+              <a:rPr lang="es-MX" dirty="0"/>
+              <a:t>Reparando Cambios en local</a:t>
+            </a:r>
+          </a:p>
+        </p:txBody>
+      </p:sp>
+    </p:spTree>
+    <p:extLst>
+      <p:ext uri="{BB962C8B-B14F-4D97-AF65-F5344CB8AC3E}">
+        <p14:creationId xmlns:p14="http://schemas.microsoft.com/office/powerpoint/2010/main" val="774947749"/>
+      </p:ext>
+    </p:extLst>
+  </p:cSld>
+  <p:clrMapOvr>
+    <a:masterClrMapping/>
+  </p:clrMapOvr>
+</p:sld>
+</file>
+
+<file path=ppt/slides/slide27.xml><?xml version="1.0" encoding="utf-8"?>
 <p:sld xmlns:a="http://schemas.openxmlformats.org/drawingml/2006/main" xmlns:r="http://schemas.openxmlformats.org/officeDocument/2006/relationships" xmlns:p="http://schemas.openxmlformats.org/presentationml/2006/main">
   <p:cSld>
     <p:spTree>

</xml_diff>